<commit_message>
transformaciones lineales - valores y vectores propios - funciones vectoriales
</commit_message>
<xml_diff>
--- a/docs/IA-SPP.pptx
+++ b/docs/IA-SPP.pptx
@@ -26,6 +26,25 @@
     <p:sldId id="274" r:id="rId20"/>
     <p:sldId id="275" r:id="rId21"/>
     <p:sldId id="276" r:id="rId22"/>
+    <p:sldId id="297" r:id="rId23"/>
+    <p:sldId id="278" r:id="rId24"/>
+    <p:sldId id="279" r:id="rId25"/>
+    <p:sldId id="280" r:id="rId26"/>
+    <p:sldId id="281" r:id="rId27"/>
+    <p:sldId id="282" r:id="rId28"/>
+    <p:sldId id="288" r:id="rId29"/>
+    <p:sldId id="284" r:id="rId30"/>
+    <p:sldId id="289" r:id="rId31"/>
+    <p:sldId id="298" r:id="rId32"/>
+    <p:sldId id="283" r:id="rId33"/>
+    <p:sldId id="287" r:id="rId34"/>
+    <p:sldId id="290" r:id="rId35"/>
+    <p:sldId id="291" r:id="rId36"/>
+    <p:sldId id="292" r:id="rId37"/>
+    <p:sldId id="293" r:id="rId38"/>
+    <p:sldId id="294" r:id="rId39"/>
+    <p:sldId id="296" r:id="rId40"/>
+    <p:sldId id="295" r:id="rId41"/>
   </p:sldIdLst>
   <p:sldSz cx="12192000" cy="6858000"/>
   <p:notesSz cx="6858000" cy="9144000"/>
@@ -281,7 +300,7 @@
           <a:p>
             <a:fld id="{F2575B24-6A8A-435D-9E97-1AE9AB4EF9E8}" type="datetimeFigureOut">
               <a:rPr lang="es-CO" smtClean="0"/>
-              <a:t>26/04/2024</a:t>
+              <a:t>29/04/2024</a:t>
             </a:fld>
             <a:endParaRPr lang="es-CO"/>
           </a:p>
@@ -481,7 +500,7 @@
           <a:p>
             <a:fld id="{F2575B24-6A8A-435D-9E97-1AE9AB4EF9E8}" type="datetimeFigureOut">
               <a:rPr lang="es-CO" smtClean="0"/>
-              <a:t>26/04/2024</a:t>
+              <a:t>29/04/2024</a:t>
             </a:fld>
             <a:endParaRPr lang="es-CO"/>
           </a:p>
@@ -691,7 +710,7 @@
           <a:p>
             <a:fld id="{F2575B24-6A8A-435D-9E97-1AE9AB4EF9E8}" type="datetimeFigureOut">
               <a:rPr lang="es-CO" smtClean="0"/>
-              <a:t>26/04/2024</a:t>
+              <a:t>29/04/2024</a:t>
             </a:fld>
             <a:endParaRPr lang="es-CO"/>
           </a:p>
@@ -891,7 +910,7 @@
           <a:p>
             <a:fld id="{F2575B24-6A8A-435D-9E97-1AE9AB4EF9E8}" type="datetimeFigureOut">
               <a:rPr lang="es-CO" smtClean="0"/>
-              <a:t>26/04/2024</a:t>
+              <a:t>29/04/2024</a:t>
             </a:fld>
             <a:endParaRPr lang="es-CO"/>
           </a:p>
@@ -1167,7 +1186,7 @@
           <a:p>
             <a:fld id="{F2575B24-6A8A-435D-9E97-1AE9AB4EF9E8}" type="datetimeFigureOut">
               <a:rPr lang="es-CO" smtClean="0"/>
-              <a:t>26/04/2024</a:t>
+              <a:t>29/04/2024</a:t>
             </a:fld>
             <a:endParaRPr lang="es-CO"/>
           </a:p>
@@ -1435,7 +1454,7 @@
           <a:p>
             <a:fld id="{F2575B24-6A8A-435D-9E97-1AE9AB4EF9E8}" type="datetimeFigureOut">
               <a:rPr lang="es-CO" smtClean="0"/>
-              <a:t>26/04/2024</a:t>
+              <a:t>29/04/2024</a:t>
             </a:fld>
             <a:endParaRPr lang="es-CO"/>
           </a:p>
@@ -1850,7 +1869,7 @@
           <a:p>
             <a:fld id="{F2575B24-6A8A-435D-9E97-1AE9AB4EF9E8}" type="datetimeFigureOut">
               <a:rPr lang="es-CO" smtClean="0"/>
-              <a:t>26/04/2024</a:t>
+              <a:t>29/04/2024</a:t>
             </a:fld>
             <a:endParaRPr lang="es-CO"/>
           </a:p>
@@ -1992,7 +2011,7 @@
           <a:p>
             <a:fld id="{F2575B24-6A8A-435D-9E97-1AE9AB4EF9E8}" type="datetimeFigureOut">
               <a:rPr lang="es-CO" smtClean="0"/>
-              <a:t>26/04/2024</a:t>
+              <a:t>29/04/2024</a:t>
             </a:fld>
             <a:endParaRPr lang="es-CO"/>
           </a:p>
@@ -2105,7 +2124,7 @@
           <a:p>
             <a:fld id="{F2575B24-6A8A-435D-9E97-1AE9AB4EF9E8}" type="datetimeFigureOut">
               <a:rPr lang="es-CO" smtClean="0"/>
-              <a:t>26/04/2024</a:t>
+              <a:t>29/04/2024</a:t>
             </a:fld>
             <a:endParaRPr lang="es-CO"/>
           </a:p>
@@ -2418,7 +2437,7 @@
           <a:p>
             <a:fld id="{F2575B24-6A8A-435D-9E97-1AE9AB4EF9E8}" type="datetimeFigureOut">
               <a:rPr lang="es-CO" smtClean="0"/>
-              <a:t>26/04/2024</a:t>
+              <a:t>29/04/2024</a:t>
             </a:fld>
             <a:endParaRPr lang="es-CO"/>
           </a:p>
@@ -2707,7 +2726,7 @@
           <a:p>
             <a:fld id="{F2575B24-6A8A-435D-9E97-1AE9AB4EF9E8}" type="datetimeFigureOut">
               <a:rPr lang="es-CO" smtClean="0"/>
-              <a:t>26/04/2024</a:t>
+              <a:t>29/04/2024</a:t>
             </a:fld>
             <a:endParaRPr lang="es-CO"/>
           </a:p>
@@ -2950,7 +2969,7 @@
           <a:p>
             <a:fld id="{F2575B24-6A8A-435D-9E97-1AE9AB4EF9E8}" type="datetimeFigureOut">
               <a:rPr lang="es-CO" smtClean="0"/>
-              <a:t>26/04/2024</a:t>
+              <a:t>29/04/2024</a:t>
             </a:fld>
             <a:endParaRPr lang="es-CO"/>
           </a:p>
@@ -6128,6 +6147,1883 @@
 </p:sld>
 </file>
 
+<file path=ppt/slides/slide22.xml><?xml version="1.0" encoding="utf-8"?>
+<p:sld xmlns:a="http://schemas.openxmlformats.org/drawingml/2006/main" xmlns:r="http://schemas.openxmlformats.org/officeDocument/2006/relationships" xmlns:p="http://schemas.openxmlformats.org/presentationml/2006/main">
+  <p:cSld>
+    <p:spTree>
+      <p:nvGrpSpPr>
+        <p:cNvPr id="1" name=""/>
+        <p:cNvGrpSpPr/>
+        <p:nvPr/>
+      </p:nvGrpSpPr>
+      <p:grpSpPr>
+        <a:xfrm>
+          <a:off x="0" y="0"/>
+          <a:ext cx="0" cy="0"/>
+          <a:chOff x="0" y="0"/>
+          <a:chExt cx="0" cy="0"/>
+        </a:xfrm>
+      </p:grpSpPr>
+      <p:pic>
+        <p:nvPicPr>
+          <p:cNvPr id="3" name="Imagen 2">
+            <a:extLst>
+              <a:ext uri="{FF2B5EF4-FFF2-40B4-BE49-F238E27FC236}">
+                <a16:creationId xmlns:a16="http://schemas.microsoft.com/office/drawing/2014/main" id="{DC2EBB56-3B02-4557-9BCE-1E5EB6CB0598}"/>
+              </a:ext>
+            </a:extLst>
+          </p:cNvPr>
+          <p:cNvPicPr>
+            <a:picLocks noChangeAspect="1"/>
+          </p:cNvPicPr>
+          <p:nvPr/>
+        </p:nvPicPr>
+        <p:blipFill>
+          <a:blip r:embed="rId2"/>
+          <a:stretch>
+            <a:fillRect/>
+          </a:stretch>
+        </p:blipFill>
+        <p:spPr>
+          <a:xfrm>
+            <a:off x="3634826" y="1576387"/>
+            <a:ext cx="7781925" cy="3705225"/>
+          </a:xfrm>
+          <a:prstGeom prst="rect">
+            <a:avLst/>
+          </a:prstGeom>
+        </p:spPr>
+      </p:pic>
+      <p:sp>
+        <p:nvSpPr>
+          <p:cNvPr id="4" name="CuadroTexto 3">
+            <a:extLst>
+              <a:ext uri="{FF2B5EF4-FFF2-40B4-BE49-F238E27FC236}">
+                <a16:creationId xmlns:a16="http://schemas.microsoft.com/office/drawing/2014/main" id="{98B26D84-05D2-4BB3-AEBA-CEC164990D42}"/>
+              </a:ext>
+            </a:extLst>
+          </p:cNvPr>
+          <p:cNvSpPr txBox="1"/>
+          <p:nvPr/>
+        </p:nvSpPr>
+        <p:spPr>
+          <a:xfrm>
+            <a:off x="340822" y="1997838"/>
+            <a:ext cx="3175462" cy="2862322"/>
+          </a:xfrm>
+          <a:prstGeom prst="rect">
+            <a:avLst/>
+          </a:prstGeom>
+          <a:noFill/>
+        </p:spPr>
+        <p:txBody>
+          <a:bodyPr wrap="square" rtlCol="0">
+            <a:spAutoFit/>
+          </a:bodyPr>
+          <a:lstStyle/>
+          <a:p>
+            <a:r>
+              <a:rPr lang="es-MX" b="0" i="0" dirty="0">
+                <a:solidFill>
+                  <a:srgbClr val="0D0D0D"/>
+                </a:solidFill>
+                <a:effectLst/>
+                <a:latin typeface="Söhne"/>
+              </a:rPr>
+              <a:t>Las capas densas o completamente conectadas realizan transformaciones lineales de las entradas antes de aplicar una función de activación no lineal. Estas transformaciones son esenciales para modelar relaciones complejas en los datos.</a:t>
+            </a:r>
+            <a:endParaRPr lang="es-CO" dirty="0"/>
+          </a:p>
+        </p:txBody>
+      </p:sp>
+    </p:spTree>
+    <p:extLst>
+      <p:ext uri="{BB962C8B-B14F-4D97-AF65-F5344CB8AC3E}">
+        <p14:creationId xmlns:p14="http://schemas.microsoft.com/office/powerpoint/2010/main" val="1404081872"/>
+      </p:ext>
+    </p:extLst>
+  </p:cSld>
+  <p:clrMapOvr>
+    <a:masterClrMapping/>
+  </p:clrMapOvr>
+</p:sld>
+</file>
+
+<file path=ppt/slides/slide23.xml><?xml version="1.0" encoding="utf-8"?>
+<p:sld xmlns:a="http://schemas.openxmlformats.org/drawingml/2006/main" xmlns:r="http://schemas.openxmlformats.org/officeDocument/2006/relationships" xmlns:p="http://schemas.openxmlformats.org/presentationml/2006/main">
+  <p:cSld>
+    <p:spTree>
+      <p:nvGrpSpPr>
+        <p:cNvPr id="1" name=""/>
+        <p:cNvGrpSpPr/>
+        <p:nvPr/>
+      </p:nvGrpSpPr>
+      <p:grpSpPr>
+        <a:xfrm>
+          <a:off x="0" y="0"/>
+          <a:ext cx="0" cy="0"/>
+          <a:chOff x="0" y="0"/>
+          <a:chExt cx="0" cy="0"/>
+        </a:xfrm>
+      </p:grpSpPr>
+      <p:pic>
+        <p:nvPicPr>
+          <p:cNvPr id="5" name="Imagen 4">
+            <a:extLst>
+              <a:ext uri="{FF2B5EF4-FFF2-40B4-BE49-F238E27FC236}">
+                <a16:creationId xmlns:a16="http://schemas.microsoft.com/office/drawing/2014/main" id="{91887150-8A81-43D1-98A9-148925185B88}"/>
+              </a:ext>
+            </a:extLst>
+          </p:cNvPr>
+          <p:cNvPicPr>
+            <a:picLocks noChangeAspect="1"/>
+          </p:cNvPicPr>
+          <p:nvPr/>
+        </p:nvPicPr>
+        <p:blipFill>
+          <a:blip r:embed="rId2"/>
+          <a:stretch>
+            <a:fillRect/>
+          </a:stretch>
+        </p:blipFill>
+        <p:spPr>
+          <a:xfrm>
+            <a:off x="1798147" y="510193"/>
+            <a:ext cx="8362950" cy="2771775"/>
+          </a:xfrm>
+          <a:prstGeom prst="rect">
+            <a:avLst/>
+          </a:prstGeom>
+        </p:spPr>
+      </p:pic>
+      <p:pic>
+        <p:nvPicPr>
+          <p:cNvPr id="11" name="Imagen 10">
+            <a:extLst>
+              <a:ext uri="{FF2B5EF4-FFF2-40B4-BE49-F238E27FC236}">
+                <a16:creationId xmlns:a16="http://schemas.microsoft.com/office/drawing/2014/main" id="{1783A56F-4E53-4266-8ABC-96AEF4213E6D}"/>
+              </a:ext>
+            </a:extLst>
+          </p:cNvPr>
+          <p:cNvPicPr>
+            <a:picLocks noChangeAspect="1"/>
+          </p:cNvPicPr>
+          <p:nvPr/>
+        </p:nvPicPr>
+        <p:blipFill>
+          <a:blip r:embed="rId3"/>
+          <a:stretch>
+            <a:fillRect/>
+          </a:stretch>
+        </p:blipFill>
+        <p:spPr>
+          <a:xfrm>
+            <a:off x="1855297" y="3925166"/>
+            <a:ext cx="8248650" cy="2000250"/>
+          </a:xfrm>
+          <a:prstGeom prst="rect">
+            <a:avLst/>
+          </a:prstGeom>
+        </p:spPr>
+      </p:pic>
+    </p:spTree>
+    <p:extLst>
+      <p:ext uri="{BB962C8B-B14F-4D97-AF65-F5344CB8AC3E}">
+        <p14:creationId xmlns:p14="http://schemas.microsoft.com/office/powerpoint/2010/main" val="1597973121"/>
+      </p:ext>
+    </p:extLst>
+  </p:cSld>
+  <p:clrMapOvr>
+    <a:masterClrMapping/>
+  </p:clrMapOvr>
+  <p:timing>
+    <p:tnLst>
+      <p:par>
+        <p:cTn id="1" dur="indefinite" restart="never" nodeType="tmRoot">
+          <p:childTnLst>
+            <p:seq concurrent="1" nextAc="seek">
+              <p:cTn id="2" dur="indefinite" nodeType="mainSeq">
+                <p:childTnLst>
+                  <p:par>
+                    <p:cTn id="3" fill="hold">
+                      <p:stCondLst>
+                        <p:cond delay="indefinite"/>
+                      </p:stCondLst>
+                      <p:childTnLst>
+                        <p:par>
+                          <p:cTn id="4" fill="hold">
+                            <p:stCondLst>
+                              <p:cond delay="0"/>
+                            </p:stCondLst>
+                            <p:childTnLst>
+                              <p:par>
+                                <p:cTn id="5" presetID="1" presetClass="entr" presetSubtype="0" fill="hold" nodeType="clickEffect">
+                                  <p:stCondLst>
+                                    <p:cond delay="0"/>
+                                  </p:stCondLst>
+                                  <p:childTnLst>
+                                    <p:set>
+                                      <p:cBhvr>
+                                        <p:cTn id="6" dur="1" fill="hold">
+                                          <p:stCondLst>
+                                            <p:cond delay="0"/>
+                                          </p:stCondLst>
+                                        </p:cTn>
+                                        <p:tgtEl>
+                                          <p:spTgt spid="11"/>
+                                        </p:tgtEl>
+                                        <p:attrNameLst>
+                                          <p:attrName>style.visibility</p:attrName>
+                                        </p:attrNameLst>
+                                      </p:cBhvr>
+                                      <p:to>
+                                        <p:strVal val="visible"/>
+                                      </p:to>
+                                    </p:set>
+                                  </p:childTnLst>
+                                </p:cTn>
+                              </p:par>
+                            </p:childTnLst>
+                          </p:cTn>
+                        </p:par>
+                      </p:childTnLst>
+                    </p:cTn>
+                  </p:par>
+                </p:childTnLst>
+              </p:cTn>
+              <p:prevCondLst>
+                <p:cond evt="onPrev" delay="0">
+                  <p:tgtEl>
+                    <p:sldTgt/>
+                  </p:tgtEl>
+                </p:cond>
+              </p:prevCondLst>
+              <p:nextCondLst>
+                <p:cond evt="onNext" delay="0">
+                  <p:tgtEl>
+                    <p:sldTgt/>
+                  </p:tgtEl>
+                </p:cond>
+              </p:nextCondLst>
+            </p:seq>
+          </p:childTnLst>
+        </p:cTn>
+      </p:par>
+    </p:tnLst>
+  </p:timing>
+</p:sld>
+</file>
+
+<file path=ppt/slides/slide24.xml><?xml version="1.0" encoding="utf-8"?>
+<p:sld xmlns:a="http://schemas.openxmlformats.org/drawingml/2006/main" xmlns:r="http://schemas.openxmlformats.org/officeDocument/2006/relationships" xmlns:p="http://schemas.openxmlformats.org/presentationml/2006/main">
+  <p:cSld>
+    <p:spTree>
+      <p:nvGrpSpPr>
+        <p:cNvPr id="1" name=""/>
+        <p:cNvGrpSpPr/>
+        <p:nvPr/>
+      </p:nvGrpSpPr>
+      <p:grpSpPr>
+        <a:xfrm>
+          <a:off x="0" y="0"/>
+          <a:ext cx="0" cy="0"/>
+          <a:chOff x="0" y="0"/>
+          <a:chExt cx="0" cy="0"/>
+        </a:xfrm>
+      </p:grpSpPr>
+      <p:pic>
+        <p:nvPicPr>
+          <p:cNvPr id="5" name="Imagen 4">
+            <a:extLst>
+              <a:ext uri="{FF2B5EF4-FFF2-40B4-BE49-F238E27FC236}">
+                <a16:creationId xmlns:a16="http://schemas.microsoft.com/office/drawing/2014/main" id="{A037BFFA-CB17-4A80-B9E1-B8132A718A77}"/>
+              </a:ext>
+            </a:extLst>
+          </p:cNvPr>
+          <p:cNvPicPr>
+            <a:picLocks noChangeAspect="1"/>
+          </p:cNvPicPr>
+          <p:nvPr/>
+        </p:nvPicPr>
+        <p:blipFill>
+          <a:blip r:embed="rId2"/>
+          <a:stretch>
+            <a:fillRect/>
+          </a:stretch>
+        </p:blipFill>
+        <p:spPr>
+          <a:xfrm>
+            <a:off x="1647825" y="3969847"/>
+            <a:ext cx="8943975" cy="2771775"/>
+          </a:xfrm>
+          <a:prstGeom prst="rect">
+            <a:avLst/>
+          </a:prstGeom>
+        </p:spPr>
+      </p:pic>
+      <p:pic>
+        <p:nvPicPr>
+          <p:cNvPr id="6" name="Imagen 5">
+            <a:extLst>
+              <a:ext uri="{FF2B5EF4-FFF2-40B4-BE49-F238E27FC236}">
+                <a16:creationId xmlns:a16="http://schemas.microsoft.com/office/drawing/2014/main" id="{BD194BF2-DDA1-4FF9-8B9C-448E6D3AA83C}"/>
+              </a:ext>
+            </a:extLst>
+          </p:cNvPr>
+          <p:cNvPicPr>
+            <a:picLocks noChangeAspect="1"/>
+          </p:cNvPicPr>
+          <p:nvPr/>
+        </p:nvPicPr>
+        <p:blipFill>
+          <a:blip r:embed="rId3"/>
+          <a:stretch>
+            <a:fillRect/>
+          </a:stretch>
+        </p:blipFill>
+        <p:spPr>
+          <a:xfrm>
+            <a:off x="1647825" y="84946"/>
+            <a:ext cx="8991600" cy="2076450"/>
+          </a:xfrm>
+          <a:prstGeom prst="rect">
+            <a:avLst/>
+          </a:prstGeom>
+        </p:spPr>
+      </p:pic>
+      <p:pic>
+        <p:nvPicPr>
+          <p:cNvPr id="7" name="Imagen 6">
+            <a:extLst>
+              <a:ext uri="{FF2B5EF4-FFF2-40B4-BE49-F238E27FC236}">
+                <a16:creationId xmlns:a16="http://schemas.microsoft.com/office/drawing/2014/main" id="{19722837-2C01-49FE-8B08-EBE4DEE47C53}"/>
+              </a:ext>
+            </a:extLst>
+          </p:cNvPr>
+          <p:cNvPicPr>
+            <a:picLocks noChangeAspect="1"/>
+          </p:cNvPicPr>
+          <p:nvPr/>
+        </p:nvPicPr>
+        <p:blipFill>
+          <a:blip r:embed="rId4"/>
+          <a:stretch>
+            <a:fillRect/>
+          </a:stretch>
+        </p:blipFill>
+        <p:spPr>
+          <a:xfrm>
+            <a:off x="1647825" y="2384584"/>
+            <a:ext cx="8896350" cy="1362075"/>
+          </a:xfrm>
+          <a:prstGeom prst="rect">
+            <a:avLst/>
+          </a:prstGeom>
+        </p:spPr>
+      </p:pic>
+    </p:spTree>
+    <p:extLst>
+      <p:ext uri="{BB962C8B-B14F-4D97-AF65-F5344CB8AC3E}">
+        <p14:creationId xmlns:p14="http://schemas.microsoft.com/office/powerpoint/2010/main" val="63360921"/>
+      </p:ext>
+    </p:extLst>
+  </p:cSld>
+  <p:clrMapOvr>
+    <a:masterClrMapping/>
+  </p:clrMapOvr>
+  <p:timing>
+    <p:tnLst>
+      <p:par>
+        <p:cTn id="1" dur="indefinite" restart="never" nodeType="tmRoot">
+          <p:childTnLst>
+            <p:seq concurrent="1" nextAc="seek">
+              <p:cTn id="2" dur="indefinite" nodeType="mainSeq">
+                <p:childTnLst>
+                  <p:par>
+                    <p:cTn id="3" fill="hold">
+                      <p:stCondLst>
+                        <p:cond delay="indefinite"/>
+                      </p:stCondLst>
+                      <p:childTnLst>
+                        <p:par>
+                          <p:cTn id="4" fill="hold">
+                            <p:stCondLst>
+                              <p:cond delay="0"/>
+                            </p:stCondLst>
+                            <p:childTnLst>
+                              <p:par>
+                                <p:cTn id="5" presetID="1" presetClass="entr" presetSubtype="0" fill="hold" nodeType="clickEffect">
+                                  <p:stCondLst>
+                                    <p:cond delay="0"/>
+                                  </p:stCondLst>
+                                  <p:childTnLst>
+                                    <p:set>
+                                      <p:cBhvr>
+                                        <p:cTn id="6" dur="1" fill="hold">
+                                          <p:stCondLst>
+                                            <p:cond delay="0"/>
+                                          </p:stCondLst>
+                                        </p:cTn>
+                                        <p:tgtEl>
+                                          <p:spTgt spid="7"/>
+                                        </p:tgtEl>
+                                        <p:attrNameLst>
+                                          <p:attrName>style.visibility</p:attrName>
+                                        </p:attrNameLst>
+                                      </p:cBhvr>
+                                      <p:to>
+                                        <p:strVal val="visible"/>
+                                      </p:to>
+                                    </p:set>
+                                  </p:childTnLst>
+                                </p:cTn>
+                              </p:par>
+                            </p:childTnLst>
+                          </p:cTn>
+                        </p:par>
+                      </p:childTnLst>
+                    </p:cTn>
+                  </p:par>
+                  <p:par>
+                    <p:cTn id="7" fill="hold">
+                      <p:stCondLst>
+                        <p:cond delay="indefinite"/>
+                      </p:stCondLst>
+                      <p:childTnLst>
+                        <p:par>
+                          <p:cTn id="8" fill="hold">
+                            <p:stCondLst>
+                              <p:cond delay="0"/>
+                            </p:stCondLst>
+                            <p:childTnLst>
+                              <p:par>
+                                <p:cTn id="9" presetID="1" presetClass="entr" presetSubtype="0" fill="hold" nodeType="clickEffect">
+                                  <p:stCondLst>
+                                    <p:cond delay="0"/>
+                                  </p:stCondLst>
+                                  <p:childTnLst>
+                                    <p:set>
+                                      <p:cBhvr>
+                                        <p:cTn id="10" dur="1" fill="hold">
+                                          <p:stCondLst>
+                                            <p:cond delay="0"/>
+                                          </p:stCondLst>
+                                        </p:cTn>
+                                        <p:tgtEl>
+                                          <p:spTgt spid="5"/>
+                                        </p:tgtEl>
+                                        <p:attrNameLst>
+                                          <p:attrName>style.visibility</p:attrName>
+                                        </p:attrNameLst>
+                                      </p:cBhvr>
+                                      <p:to>
+                                        <p:strVal val="visible"/>
+                                      </p:to>
+                                    </p:set>
+                                  </p:childTnLst>
+                                </p:cTn>
+                              </p:par>
+                            </p:childTnLst>
+                          </p:cTn>
+                        </p:par>
+                      </p:childTnLst>
+                    </p:cTn>
+                  </p:par>
+                </p:childTnLst>
+              </p:cTn>
+              <p:prevCondLst>
+                <p:cond evt="onPrev" delay="0">
+                  <p:tgtEl>
+                    <p:sldTgt/>
+                  </p:tgtEl>
+                </p:cond>
+              </p:prevCondLst>
+              <p:nextCondLst>
+                <p:cond evt="onNext" delay="0">
+                  <p:tgtEl>
+                    <p:sldTgt/>
+                  </p:tgtEl>
+                </p:cond>
+              </p:nextCondLst>
+            </p:seq>
+          </p:childTnLst>
+        </p:cTn>
+      </p:par>
+    </p:tnLst>
+  </p:timing>
+</p:sld>
+</file>
+
+<file path=ppt/slides/slide25.xml><?xml version="1.0" encoding="utf-8"?>
+<p:sld xmlns:a="http://schemas.openxmlformats.org/drawingml/2006/main" xmlns:r="http://schemas.openxmlformats.org/officeDocument/2006/relationships" xmlns:p="http://schemas.openxmlformats.org/presentationml/2006/main">
+  <p:cSld>
+    <p:spTree>
+      <p:nvGrpSpPr>
+        <p:cNvPr id="1" name=""/>
+        <p:cNvGrpSpPr/>
+        <p:nvPr/>
+      </p:nvGrpSpPr>
+      <p:grpSpPr>
+        <a:xfrm>
+          <a:off x="0" y="0"/>
+          <a:ext cx="0" cy="0"/>
+          <a:chOff x="0" y="0"/>
+          <a:chExt cx="0" cy="0"/>
+        </a:xfrm>
+      </p:grpSpPr>
+      <p:pic>
+        <p:nvPicPr>
+          <p:cNvPr id="5" name="Imagen 4">
+            <a:extLst>
+              <a:ext uri="{FF2B5EF4-FFF2-40B4-BE49-F238E27FC236}">
+                <a16:creationId xmlns:a16="http://schemas.microsoft.com/office/drawing/2014/main" id="{7AEE7178-2C9A-4330-A1C8-1017FCEE603C}"/>
+              </a:ext>
+            </a:extLst>
+          </p:cNvPr>
+          <p:cNvPicPr>
+            <a:picLocks noChangeAspect="1"/>
+          </p:cNvPicPr>
+          <p:nvPr/>
+        </p:nvPicPr>
+        <p:blipFill>
+          <a:blip r:embed="rId2"/>
+          <a:stretch>
+            <a:fillRect/>
+          </a:stretch>
+        </p:blipFill>
+        <p:spPr>
+          <a:xfrm>
+            <a:off x="1914525" y="335539"/>
+            <a:ext cx="8362950" cy="1781175"/>
+          </a:xfrm>
+          <a:prstGeom prst="rect">
+            <a:avLst/>
+          </a:prstGeom>
+        </p:spPr>
+      </p:pic>
+      <p:pic>
+        <p:nvPicPr>
+          <p:cNvPr id="7" name="Imagen 6">
+            <a:extLst>
+              <a:ext uri="{FF2B5EF4-FFF2-40B4-BE49-F238E27FC236}">
+                <a16:creationId xmlns:a16="http://schemas.microsoft.com/office/drawing/2014/main" id="{54EB5F73-F4C0-4A86-852D-F7B18182FED2}"/>
+              </a:ext>
+            </a:extLst>
+          </p:cNvPr>
+          <p:cNvPicPr>
+            <a:picLocks noChangeAspect="1"/>
+          </p:cNvPicPr>
+          <p:nvPr/>
+        </p:nvPicPr>
+        <p:blipFill>
+          <a:blip r:embed="rId3"/>
+          <a:stretch>
+            <a:fillRect/>
+          </a:stretch>
+        </p:blipFill>
+        <p:spPr>
+          <a:xfrm>
+            <a:off x="850929" y="2631324"/>
+            <a:ext cx="8029575" cy="3390900"/>
+          </a:xfrm>
+          <a:prstGeom prst="rect">
+            <a:avLst/>
+          </a:prstGeom>
+        </p:spPr>
+      </p:pic>
+      <p:pic>
+        <p:nvPicPr>
+          <p:cNvPr id="9" name="Imagen 8">
+            <a:extLst>
+              <a:ext uri="{FF2B5EF4-FFF2-40B4-BE49-F238E27FC236}">
+                <a16:creationId xmlns:a16="http://schemas.microsoft.com/office/drawing/2014/main" id="{128C16EC-22E3-40DC-A87A-B50B8BF6DC32}"/>
+              </a:ext>
+            </a:extLst>
+          </p:cNvPr>
+          <p:cNvPicPr>
+            <a:picLocks noChangeAspect="1"/>
+          </p:cNvPicPr>
+          <p:nvPr/>
+        </p:nvPicPr>
+        <p:blipFill>
+          <a:blip r:embed="rId4"/>
+          <a:stretch>
+            <a:fillRect/>
+          </a:stretch>
+        </p:blipFill>
+        <p:spPr>
+          <a:xfrm>
+            <a:off x="9575223" y="4029940"/>
+            <a:ext cx="1238250" cy="876300"/>
+          </a:xfrm>
+          <a:prstGeom prst="rect">
+            <a:avLst/>
+          </a:prstGeom>
+        </p:spPr>
+      </p:pic>
+      <p:pic>
+        <p:nvPicPr>
+          <p:cNvPr id="11" name="Imagen 10">
+            <a:extLst>
+              <a:ext uri="{FF2B5EF4-FFF2-40B4-BE49-F238E27FC236}">
+                <a16:creationId xmlns:a16="http://schemas.microsoft.com/office/drawing/2014/main" id="{D866B1C3-0DB5-44DD-B5B7-224BBF764F11}"/>
+              </a:ext>
+            </a:extLst>
+          </p:cNvPr>
+          <p:cNvPicPr>
+            <a:picLocks noChangeAspect="1"/>
+          </p:cNvPicPr>
+          <p:nvPr/>
+        </p:nvPicPr>
+        <p:blipFill>
+          <a:blip r:embed="rId5"/>
+          <a:stretch>
+            <a:fillRect/>
+          </a:stretch>
+        </p:blipFill>
+        <p:spPr>
+          <a:xfrm>
+            <a:off x="9551410" y="3201785"/>
+            <a:ext cx="1285875" cy="857250"/>
+          </a:xfrm>
+          <a:prstGeom prst="rect">
+            <a:avLst/>
+          </a:prstGeom>
+        </p:spPr>
+      </p:pic>
+    </p:spTree>
+    <p:extLst>
+      <p:ext uri="{BB962C8B-B14F-4D97-AF65-F5344CB8AC3E}">
+        <p14:creationId xmlns:p14="http://schemas.microsoft.com/office/powerpoint/2010/main" val="660501213"/>
+      </p:ext>
+    </p:extLst>
+  </p:cSld>
+  <p:clrMapOvr>
+    <a:masterClrMapping/>
+  </p:clrMapOvr>
+  <p:timing>
+    <p:tnLst>
+      <p:par>
+        <p:cTn id="1" dur="indefinite" restart="never" nodeType="tmRoot">
+          <p:childTnLst>
+            <p:seq concurrent="1" nextAc="seek">
+              <p:cTn id="2" dur="indefinite" nodeType="mainSeq">
+                <p:childTnLst>
+                  <p:par>
+                    <p:cTn id="3" fill="hold">
+                      <p:stCondLst>
+                        <p:cond delay="indefinite"/>
+                      </p:stCondLst>
+                      <p:childTnLst>
+                        <p:par>
+                          <p:cTn id="4" fill="hold">
+                            <p:stCondLst>
+                              <p:cond delay="0"/>
+                            </p:stCondLst>
+                            <p:childTnLst>
+                              <p:par>
+                                <p:cTn id="5" presetID="1" presetClass="entr" presetSubtype="0" fill="hold" nodeType="clickEffect">
+                                  <p:stCondLst>
+                                    <p:cond delay="0"/>
+                                  </p:stCondLst>
+                                  <p:childTnLst>
+                                    <p:set>
+                                      <p:cBhvr>
+                                        <p:cTn id="6" dur="1" fill="hold">
+                                          <p:stCondLst>
+                                            <p:cond delay="0"/>
+                                          </p:stCondLst>
+                                        </p:cTn>
+                                        <p:tgtEl>
+                                          <p:spTgt spid="11"/>
+                                        </p:tgtEl>
+                                        <p:attrNameLst>
+                                          <p:attrName>style.visibility</p:attrName>
+                                        </p:attrNameLst>
+                                      </p:cBhvr>
+                                      <p:to>
+                                        <p:strVal val="visible"/>
+                                      </p:to>
+                                    </p:set>
+                                  </p:childTnLst>
+                                </p:cTn>
+                              </p:par>
+                              <p:par>
+                                <p:cTn id="7" presetID="1" presetClass="entr" presetSubtype="0" fill="hold" nodeType="withEffect">
+                                  <p:stCondLst>
+                                    <p:cond delay="0"/>
+                                  </p:stCondLst>
+                                  <p:childTnLst>
+                                    <p:set>
+                                      <p:cBhvr>
+                                        <p:cTn id="8" dur="1" fill="hold">
+                                          <p:stCondLst>
+                                            <p:cond delay="0"/>
+                                          </p:stCondLst>
+                                        </p:cTn>
+                                        <p:tgtEl>
+                                          <p:spTgt spid="9"/>
+                                        </p:tgtEl>
+                                        <p:attrNameLst>
+                                          <p:attrName>style.visibility</p:attrName>
+                                        </p:attrNameLst>
+                                      </p:cBhvr>
+                                      <p:to>
+                                        <p:strVal val="visible"/>
+                                      </p:to>
+                                    </p:set>
+                                  </p:childTnLst>
+                                </p:cTn>
+                              </p:par>
+                              <p:par>
+                                <p:cTn id="9" presetID="1" presetClass="entr" presetSubtype="0" fill="hold" nodeType="withEffect">
+                                  <p:stCondLst>
+                                    <p:cond delay="0"/>
+                                  </p:stCondLst>
+                                  <p:childTnLst>
+                                    <p:set>
+                                      <p:cBhvr>
+                                        <p:cTn id="10" dur="1" fill="hold">
+                                          <p:stCondLst>
+                                            <p:cond delay="0"/>
+                                          </p:stCondLst>
+                                        </p:cTn>
+                                        <p:tgtEl>
+                                          <p:spTgt spid="7"/>
+                                        </p:tgtEl>
+                                        <p:attrNameLst>
+                                          <p:attrName>style.visibility</p:attrName>
+                                        </p:attrNameLst>
+                                      </p:cBhvr>
+                                      <p:to>
+                                        <p:strVal val="visible"/>
+                                      </p:to>
+                                    </p:set>
+                                  </p:childTnLst>
+                                </p:cTn>
+                              </p:par>
+                            </p:childTnLst>
+                          </p:cTn>
+                        </p:par>
+                      </p:childTnLst>
+                    </p:cTn>
+                  </p:par>
+                </p:childTnLst>
+              </p:cTn>
+              <p:prevCondLst>
+                <p:cond evt="onPrev" delay="0">
+                  <p:tgtEl>
+                    <p:sldTgt/>
+                  </p:tgtEl>
+                </p:cond>
+              </p:prevCondLst>
+              <p:nextCondLst>
+                <p:cond evt="onNext" delay="0">
+                  <p:tgtEl>
+                    <p:sldTgt/>
+                  </p:tgtEl>
+                </p:cond>
+              </p:nextCondLst>
+            </p:seq>
+          </p:childTnLst>
+        </p:cTn>
+      </p:par>
+    </p:tnLst>
+  </p:timing>
+</p:sld>
+</file>
+
+<file path=ppt/slides/slide26.xml><?xml version="1.0" encoding="utf-8"?>
+<p:sld xmlns:a="http://schemas.openxmlformats.org/drawingml/2006/main" xmlns:r="http://schemas.openxmlformats.org/officeDocument/2006/relationships" xmlns:p="http://schemas.openxmlformats.org/presentationml/2006/main">
+  <p:cSld>
+    <p:spTree>
+      <p:nvGrpSpPr>
+        <p:cNvPr id="1" name=""/>
+        <p:cNvGrpSpPr/>
+        <p:nvPr/>
+      </p:nvGrpSpPr>
+      <p:grpSpPr>
+        <a:xfrm>
+          <a:off x="0" y="0"/>
+          <a:ext cx="0" cy="0"/>
+          <a:chOff x="0" y="0"/>
+          <a:chExt cx="0" cy="0"/>
+        </a:xfrm>
+      </p:grpSpPr>
+      <p:pic>
+        <p:nvPicPr>
+          <p:cNvPr id="5" name="Imagen 4">
+            <a:extLst>
+              <a:ext uri="{FF2B5EF4-FFF2-40B4-BE49-F238E27FC236}">
+                <a16:creationId xmlns:a16="http://schemas.microsoft.com/office/drawing/2014/main" id="{504F72ED-82E1-46EA-8D97-D19CEE7B1C7D}"/>
+              </a:ext>
+            </a:extLst>
+          </p:cNvPr>
+          <p:cNvPicPr>
+            <a:picLocks noChangeAspect="1"/>
+          </p:cNvPicPr>
+          <p:nvPr/>
+        </p:nvPicPr>
+        <p:blipFill>
+          <a:blip r:embed="rId2"/>
+          <a:stretch>
+            <a:fillRect/>
+          </a:stretch>
+        </p:blipFill>
+        <p:spPr>
+          <a:xfrm>
+            <a:off x="575484" y="1419225"/>
+            <a:ext cx="7067550" cy="4019550"/>
+          </a:xfrm>
+          <a:prstGeom prst="rect">
+            <a:avLst/>
+          </a:prstGeom>
+        </p:spPr>
+      </p:pic>
+      <p:pic>
+        <p:nvPicPr>
+          <p:cNvPr id="7" name="Imagen 6">
+            <a:extLst>
+              <a:ext uri="{FF2B5EF4-FFF2-40B4-BE49-F238E27FC236}">
+                <a16:creationId xmlns:a16="http://schemas.microsoft.com/office/drawing/2014/main" id="{EFEE8237-2B52-4017-A9A5-3B4D7FCA06D9}"/>
+              </a:ext>
+            </a:extLst>
+          </p:cNvPr>
+          <p:cNvPicPr>
+            <a:picLocks noChangeAspect="1"/>
+          </p:cNvPicPr>
+          <p:nvPr/>
+        </p:nvPicPr>
+        <p:blipFill>
+          <a:blip r:embed="rId3"/>
+          <a:stretch>
+            <a:fillRect/>
+          </a:stretch>
+        </p:blipFill>
+        <p:spPr>
+          <a:xfrm>
+            <a:off x="2756709" y="1543916"/>
+            <a:ext cx="1352550" cy="828675"/>
+          </a:xfrm>
+          <a:prstGeom prst="rect">
+            <a:avLst/>
+          </a:prstGeom>
+        </p:spPr>
+      </p:pic>
+      <p:sp>
+        <p:nvSpPr>
+          <p:cNvPr id="8" name="CuadroTexto 7">
+            <a:extLst>
+              <a:ext uri="{FF2B5EF4-FFF2-40B4-BE49-F238E27FC236}">
+                <a16:creationId xmlns:a16="http://schemas.microsoft.com/office/drawing/2014/main" id="{E30C60B4-F900-4682-9521-4D1C25FFE177}"/>
+              </a:ext>
+            </a:extLst>
+          </p:cNvPr>
+          <p:cNvSpPr txBox="1"/>
+          <p:nvPr/>
+        </p:nvSpPr>
+        <p:spPr>
+          <a:xfrm>
+            <a:off x="8539248" y="1635087"/>
+            <a:ext cx="2312323" cy="646331"/>
+          </a:xfrm>
+          <a:prstGeom prst="rect">
+            <a:avLst/>
+          </a:prstGeom>
+          <a:noFill/>
+        </p:spPr>
+        <p:txBody>
+          <a:bodyPr wrap="square" rtlCol="0">
+            <a:spAutoFit/>
+          </a:bodyPr>
+          <a:lstStyle/>
+          <a:p>
+            <a:r>
+              <a:rPr lang="es-MX" dirty="0"/>
+              <a:t>¿Qué ocurre con estas transformaciones?</a:t>
+            </a:r>
+            <a:endParaRPr lang="es-CO" dirty="0"/>
+          </a:p>
+        </p:txBody>
+      </p:sp>
+      <p:pic>
+        <p:nvPicPr>
+          <p:cNvPr id="10" name="Imagen 9">
+            <a:extLst>
+              <a:ext uri="{FF2B5EF4-FFF2-40B4-BE49-F238E27FC236}">
+                <a16:creationId xmlns:a16="http://schemas.microsoft.com/office/drawing/2014/main" id="{644A74D4-9BCA-4C6A-A97F-D89C08671DC1}"/>
+              </a:ext>
+            </a:extLst>
+          </p:cNvPr>
+          <p:cNvPicPr>
+            <a:picLocks noChangeAspect="1"/>
+          </p:cNvPicPr>
+          <p:nvPr/>
+        </p:nvPicPr>
+        <p:blipFill>
+          <a:blip r:embed="rId4"/>
+          <a:stretch>
+            <a:fillRect/>
+          </a:stretch>
+        </p:blipFill>
+        <p:spPr>
+          <a:xfrm>
+            <a:off x="8923886" y="2212917"/>
+            <a:ext cx="1543050" cy="952500"/>
+          </a:xfrm>
+          <a:prstGeom prst="rect">
+            <a:avLst/>
+          </a:prstGeom>
+        </p:spPr>
+      </p:pic>
+      <p:pic>
+        <p:nvPicPr>
+          <p:cNvPr id="12" name="Imagen 11">
+            <a:extLst>
+              <a:ext uri="{FF2B5EF4-FFF2-40B4-BE49-F238E27FC236}">
+                <a16:creationId xmlns:a16="http://schemas.microsoft.com/office/drawing/2014/main" id="{1890277B-6CAC-4F76-BBEE-9BFF13523850}"/>
+              </a:ext>
+            </a:extLst>
+          </p:cNvPr>
+          <p:cNvPicPr>
+            <a:picLocks noChangeAspect="1"/>
+          </p:cNvPicPr>
+          <p:nvPr/>
+        </p:nvPicPr>
+        <p:blipFill>
+          <a:blip r:embed="rId5"/>
+          <a:stretch>
+            <a:fillRect/>
+          </a:stretch>
+        </p:blipFill>
+        <p:spPr>
+          <a:xfrm>
+            <a:off x="8890548" y="3242547"/>
+            <a:ext cx="1609725" cy="876300"/>
+          </a:xfrm>
+          <a:prstGeom prst="rect">
+            <a:avLst/>
+          </a:prstGeom>
+        </p:spPr>
+      </p:pic>
+    </p:spTree>
+    <p:extLst>
+      <p:ext uri="{BB962C8B-B14F-4D97-AF65-F5344CB8AC3E}">
+        <p14:creationId xmlns:p14="http://schemas.microsoft.com/office/powerpoint/2010/main" val="1512772734"/>
+      </p:ext>
+    </p:extLst>
+  </p:cSld>
+  <p:clrMapOvr>
+    <a:masterClrMapping/>
+  </p:clrMapOvr>
+  <p:timing>
+    <p:tnLst>
+      <p:par>
+        <p:cTn id="1" dur="indefinite" restart="never" nodeType="tmRoot">
+          <p:childTnLst>
+            <p:seq concurrent="1" nextAc="seek">
+              <p:cTn id="2" dur="indefinite" nodeType="mainSeq">
+                <p:childTnLst>
+                  <p:par>
+                    <p:cTn id="3" fill="hold">
+                      <p:stCondLst>
+                        <p:cond delay="indefinite"/>
+                      </p:stCondLst>
+                      <p:childTnLst>
+                        <p:par>
+                          <p:cTn id="4" fill="hold">
+                            <p:stCondLst>
+                              <p:cond delay="0"/>
+                            </p:stCondLst>
+                            <p:childTnLst>
+                              <p:par>
+                                <p:cTn id="5" presetID="1" presetClass="entr" presetSubtype="0" fill="hold" grpId="0" nodeType="clickEffect">
+                                  <p:stCondLst>
+                                    <p:cond delay="0"/>
+                                  </p:stCondLst>
+                                  <p:childTnLst>
+                                    <p:set>
+                                      <p:cBhvr>
+                                        <p:cTn id="6" dur="1" fill="hold">
+                                          <p:stCondLst>
+                                            <p:cond delay="0"/>
+                                          </p:stCondLst>
+                                        </p:cTn>
+                                        <p:tgtEl>
+                                          <p:spTgt spid="8"/>
+                                        </p:tgtEl>
+                                        <p:attrNameLst>
+                                          <p:attrName>style.visibility</p:attrName>
+                                        </p:attrNameLst>
+                                      </p:cBhvr>
+                                      <p:to>
+                                        <p:strVal val="visible"/>
+                                      </p:to>
+                                    </p:set>
+                                  </p:childTnLst>
+                                </p:cTn>
+                              </p:par>
+                              <p:par>
+                                <p:cTn id="7" presetID="1" presetClass="entr" presetSubtype="0" fill="hold" nodeType="withEffect">
+                                  <p:stCondLst>
+                                    <p:cond delay="0"/>
+                                  </p:stCondLst>
+                                  <p:childTnLst>
+                                    <p:set>
+                                      <p:cBhvr>
+                                        <p:cTn id="8" dur="1" fill="hold">
+                                          <p:stCondLst>
+                                            <p:cond delay="0"/>
+                                          </p:stCondLst>
+                                        </p:cTn>
+                                        <p:tgtEl>
+                                          <p:spTgt spid="10"/>
+                                        </p:tgtEl>
+                                        <p:attrNameLst>
+                                          <p:attrName>style.visibility</p:attrName>
+                                        </p:attrNameLst>
+                                      </p:cBhvr>
+                                      <p:to>
+                                        <p:strVal val="visible"/>
+                                      </p:to>
+                                    </p:set>
+                                  </p:childTnLst>
+                                </p:cTn>
+                              </p:par>
+                              <p:par>
+                                <p:cTn id="9" presetID="1" presetClass="entr" presetSubtype="0" fill="hold" nodeType="withEffect">
+                                  <p:stCondLst>
+                                    <p:cond delay="0"/>
+                                  </p:stCondLst>
+                                  <p:childTnLst>
+                                    <p:set>
+                                      <p:cBhvr>
+                                        <p:cTn id="10" dur="1" fill="hold">
+                                          <p:stCondLst>
+                                            <p:cond delay="0"/>
+                                          </p:stCondLst>
+                                        </p:cTn>
+                                        <p:tgtEl>
+                                          <p:spTgt spid="12"/>
+                                        </p:tgtEl>
+                                        <p:attrNameLst>
+                                          <p:attrName>style.visibility</p:attrName>
+                                        </p:attrNameLst>
+                                      </p:cBhvr>
+                                      <p:to>
+                                        <p:strVal val="visible"/>
+                                      </p:to>
+                                    </p:set>
+                                  </p:childTnLst>
+                                </p:cTn>
+                              </p:par>
+                            </p:childTnLst>
+                          </p:cTn>
+                        </p:par>
+                      </p:childTnLst>
+                    </p:cTn>
+                  </p:par>
+                </p:childTnLst>
+              </p:cTn>
+              <p:prevCondLst>
+                <p:cond evt="onPrev" delay="0">
+                  <p:tgtEl>
+                    <p:sldTgt/>
+                  </p:tgtEl>
+                </p:cond>
+              </p:prevCondLst>
+              <p:nextCondLst>
+                <p:cond evt="onNext" delay="0">
+                  <p:tgtEl>
+                    <p:sldTgt/>
+                  </p:tgtEl>
+                </p:cond>
+              </p:nextCondLst>
+            </p:seq>
+          </p:childTnLst>
+        </p:cTn>
+      </p:par>
+    </p:tnLst>
+    <p:bldLst>
+      <p:bldP spid="8" grpId="0"/>
+    </p:bldLst>
+  </p:timing>
+</p:sld>
+</file>
+
+<file path=ppt/slides/slide27.xml><?xml version="1.0" encoding="utf-8"?>
+<p:sld xmlns:a="http://schemas.openxmlformats.org/drawingml/2006/main" xmlns:r="http://schemas.openxmlformats.org/officeDocument/2006/relationships" xmlns:p="http://schemas.openxmlformats.org/presentationml/2006/main">
+  <p:cSld>
+    <p:spTree>
+      <p:nvGrpSpPr>
+        <p:cNvPr id="1" name=""/>
+        <p:cNvGrpSpPr/>
+        <p:nvPr/>
+      </p:nvGrpSpPr>
+      <p:grpSpPr>
+        <a:xfrm>
+          <a:off x="0" y="0"/>
+          <a:ext cx="0" cy="0"/>
+          <a:chOff x="0" y="0"/>
+          <a:chExt cx="0" cy="0"/>
+        </a:xfrm>
+      </p:grpSpPr>
+      <p:pic>
+        <p:nvPicPr>
+          <p:cNvPr id="6" name="Elementos multimedia en línea 5" title="Multiplication by 2">
+            <a:hlinkClick r:id="" action="ppaction://media"/>
+            <a:extLst>
+              <a:ext uri="{FF2B5EF4-FFF2-40B4-BE49-F238E27FC236}">
+                <a16:creationId xmlns:a16="http://schemas.microsoft.com/office/drawing/2014/main" id="{7CF8A4D5-74E3-4BB2-8A97-768E420D9064}"/>
+              </a:ext>
+            </a:extLst>
+          </p:cNvPr>
+          <p:cNvPicPr>
+            <a:picLocks noRot="1" noChangeAspect="1"/>
+          </p:cNvPicPr>
+          <p:nvPr>
+            <a:videoFile r:link="rId1"/>
+          </p:nvPr>
+        </p:nvPicPr>
+        <p:blipFill>
+          <a:blip r:embed="rId5"/>
+          <a:stretch>
+            <a:fillRect/>
+          </a:stretch>
+        </p:blipFill>
+        <p:spPr>
+          <a:xfrm>
+            <a:off x="1084802" y="350635"/>
+            <a:ext cx="4800138" cy="2712078"/>
+          </a:xfrm>
+          <a:prstGeom prst="rect">
+            <a:avLst/>
+          </a:prstGeom>
+        </p:spPr>
+      </p:pic>
+      <p:pic>
+        <p:nvPicPr>
+          <p:cNvPr id="7" name="Elementos multimedia en línea 6" title="Specific Two Dimensional Linear Transform With Background">
+            <a:hlinkClick r:id="" action="ppaction://media"/>
+            <a:extLst>
+              <a:ext uri="{FF2B5EF4-FFF2-40B4-BE49-F238E27FC236}">
+                <a16:creationId xmlns:a16="http://schemas.microsoft.com/office/drawing/2014/main" id="{050C816D-7681-434D-80FB-001D93996500}"/>
+              </a:ext>
+            </a:extLst>
+          </p:cNvPr>
+          <p:cNvPicPr>
+            <a:picLocks noRot="1" noChangeAspect="1"/>
+          </p:cNvPicPr>
+          <p:nvPr>
+            <a:videoFile r:link="rId2"/>
+          </p:nvPr>
+        </p:nvPicPr>
+        <p:blipFill>
+          <a:blip r:embed="rId6"/>
+          <a:stretch>
+            <a:fillRect/>
+          </a:stretch>
+        </p:blipFill>
+        <p:spPr>
+          <a:xfrm>
+            <a:off x="6382782" y="350635"/>
+            <a:ext cx="4800138" cy="2712078"/>
+          </a:xfrm>
+          <a:prstGeom prst="rect">
+            <a:avLst/>
+          </a:prstGeom>
+        </p:spPr>
+      </p:pic>
+      <p:pic>
+        <p:nvPicPr>
+          <p:cNvPr id="8" name="Elementos multimedia en línea 7" title="Examples Of Nonlinear Two Dimensional Transformations">
+            <a:hlinkClick r:id="" action="ppaction://media"/>
+            <a:extLst>
+              <a:ext uri="{FF2B5EF4-FFF2-40B4-BE49-F238E27FC236}">
+                <a16:creationId xmlns:a16="http://schemas.microsoft.com/office/drawing/2014/main" id="{10595B81-5F34-4722-8B2B-3B027D9280FA}"/>
+              </a:ext>
+            </a:extLst>
+          </p:cNvPr>
+          <p:cNvPicPr>
+            <a:picLocks noRot="1" noChangeAspect="1"/>
+          </p:cNvPicPr>
+          <p:nvPr>
+            <a:videoFile r:link="rId3"/>
+          </p:nvPr>
+        </p:nvPicPr>
+        <p:blipFill>
+          <a:blip r:embed="rId7"/>
+          <a:stretch>
+            <a:fillRect/>
+          </a:stretch>
+        </p:blipFill>
+        <p:spPr>
+          <a:xfrm>
+            <a:off x="3695931" y="3429000"/>
+            <a:ext cx="4800138" cy="2712078"/>
+          </a:xfrm>
+          <a:prstGeom prst="rect">
+            <a:avLst/>
+          </a:prstGeom>
+        </p:spPr>
+      </p:pic>
+    </p:spTree>
+    <p:extLst>
+      <p:ext uri="{BB962C8B-B14F-4D97-AF65-F5344CB8AC3E}">
+        <p14:creationId xmlns:p14="http://schemas.microsoft.com/office/powerpoint/2010/main" val="1303535242"/>
+      </p:ext>
+    </p:extLst>
+  </p:cSld>
+  <p:clrMapOvr>
+    <a:masterClrMapping/>
+  </p:clrMapOvr>
+  <p:timing>
+    <p:tnLst>
+      <p:par>
+        <p:cTn id="1" dur="indefinite" restart="never" nodeType="tmRoot">
+          <p:childTnLst>
+            <p:seq concurrent="1" nextAc="seek">
+              <p:cTn id="2" dur="indefinite" nodeType="mainSeq">
+                <p:childTnLst>
+                  <p:par>
+                    <p:cTn id="3" fill="hold">
+                      <p:stCondLst>
+                        <p:cond delay="indefinite"/>
+                      </p:stCondLst>
+                      <p:childTnLst>
+                        <p:par>
+                          <p:cTn id="4" fill="hold">
+                            <p:stCondLst>
+                              <p:cond delay="0"/>
+                            </p:stCondLst>
+                            <p:childTnLst>
+                              <p:par>
+                                <p:cTn id="5" presetID="1" presetClass="mediacall" presetSubtype="0" fill="hold" nodeType="clickEffect">
+                                  <p:stCondLst>
+                                    <p:cond delay="0"/>
+                                  </p:stCondLst>
+                                  <p:childTnLst>
+                                    <p:cmd type="call" cmd="playFrom(0.0)">
+                                      <p:cBhvr>
+                                        <p:cTn id="6" dur="1" fill="hold"/>
+                                        <p:tgtEl>
+                                          <p:spTgt spid="6"/>
+                                        </p:tgtEl>
+                                      </p:cBhvr>
+                                    </p:cmd>
+                                  </p:childTnLst>
+                                </p:cTn>
+                              </p:par>
+                            </p:childTnLst>
+                          </p:cTn>
+                        </p:par>
+                      </p:childTnLst>
+                    </p:cTn>
+                  </p:par>
+                  <p:par>
+                    <p:cTn id="7" fill="hold">
+                      <p:stCondLst>
+                        <p:cond delay="indefinite"/>
+                      </p:stCondLst>
+                      <p:childTnLst>
+                        <p:par>
+                          <p:cTn id="8" fill="hold">
+                            <p:stCondLst>
+                              <p:cond delay="0"/>
+                            </p:stCondLst>
+                            <p:childTnLst>
+                              <p:par>
+                                <p:cTn id="9" presetID="1" presetClass="mediacall" presetSubtype="0" fill="hold" nodeType="clickEffect">
+                                  <p:stCondLst>
+                                    <p:cond delay="0"/>
+                                  </p:stCondLst>
+                                  <p:childTnLst>
+                                    <p:cmd type="call" cmd="playFrom(0.0)">
+                                      <p:cBhvr>
+                                        <p:cTn id="10" dur="1" fill="hold"/>
+                                        <p:tgtEl>
+                                          <p:spTgt spid="7"/>
+                                        </p:tgtEl>
+                                      </p:cBhvr>
+                                    </p:cmd>
+                                  </p:childTnLst>
+                                </p:cTn>
+                              </p:par>
+                            </p:childTnLst>
+                          </p:cTn>
+                        </p:par>
+                      </p:childTnLst>
+                    </p:cTn>
+                  </p:par>
+                  <p:par>
+                    <p:cTn id="11" fill="hold">
+                      <p:stCondLst>
+                        <p:cond delay="indefinite"/>
+                      </p:stCondLst>
+                      <p:childTnLst>
+                        <p:par>
+                          <p:cTn id="12" fill="hold">
+                            <p:stCondLst>
+                              <p:cond delay="0"/>
+                            </p:stCondLst>
+                            <p:childTnLst>
+                              <p:par>
+                                <p:cTn id="13" presetID="1" presetClass="mediacall" presetSubtype="0" fill="hold" nodeType="clickEffect">
+                                  <p:stCondLst>
+                                    <p:cond delay="0"/>
+                                  </p:stCondLst>
+                                  <p:childTnLst>
+                                    <p:cmd type="call" cmd="playFrom(0.0)">
+                                      <p:cBhvr>
+                                        <p:cTn id="14" dur="1" fill="hold"/>
+                                        <p:tgtEl>
+                                          <p:spTgt spid="8"/>
+                                        </p:tgtEl>
+                                      </p:cBhvr>
+                                    </p:cmd>
+                                  </p:childTnLst>
+                                </p:cTn>
+                              </p:par>
+                            </p:childTnLst>
+                          </p:cTn>
+                        </p:par>
+                      </p:childTnLst>
+                    </p:cTn>
+                  </p:par>
+                </p:childTnLst>
+              </p:cTn>
+              <p:prevCondLst>
+                <p:cond evt="onPrev" delay="0">
+                  <p:tgtEl>
+                    <p:sldTgt/>
+                  </p:tgtEl>
+                </p:cond>
+              </p:prevCondLst>
+              <p:nextCondLst>
+                <p:cond evt="onNext" delay="0">
+                  <p:tgtEl>
+                    <p:sldTgt/>
+                  </p:tgtEl>
+                </p:cond>
+              </p:nextCondLst>
+            </p:seq>
+            <p:video>
+              <p:cMediaNode vol="80000">
+                <p:cTn id="15" fill="hold" display="0">
+                  <p:stCondLst>
+                    <p:cond delay="indefinite"/>
+                  </p:stCondLst>
+                </p:cTn>
+                <p:tgtEl>
+                  <p:spTgt spid="6"/>
+                </p:tgtEl>
+              </p:cMediaNode>
+            </p:video>
+            <p:seq concurrent="1" nextAc="seek">
+              <p:cTn id="16" restart="whenNotActive" fill="hold" evtFilter="cancelBubble" nodeType="interactiveSeq">
+                <p:stCondLst>
+                  <p:cond evt="onClick" delay="0">
+                    <p:tgtEl>
+                      <p:spTgt spid="6"/>
+                    </p:tgtEl>
+                  </p:cond>
+                </p:stCondLst>
+                <p:endSync evt="end" delay="0">
+                  <p:rtn val="all"/>
+                </p:endSync>
+                <p:childTnLst>
+                  <p:par>
+                    <p:cTn id="17" fill="hold">
+                      <p:stCondLst>
+                        <p:cond delay="0"/>
+                      </p:stCondLst>
+                      <p:childTnLst>
+                        <p:par>
+                          <p:cTn id="18" fill="hold">
+                            <p:stCondLst>
+                              <p:cond delay="0"/>
+                            </p:stCondLst>
+                            <p:childTnLst>
+                              <p:par>
+                                <p:cTn id="19" presetID="2" presetClass="mediacall" presetSubtype="0" fill="hold" nodeType="clickEffect">
+                                  <p:stCondLst>
+                                    <p:cond delay="0"/>
+                                  </p:stCondLst>
+                                  <p:childTnLst>
+                                    <p:cmd type="call" cmd="togglePause">
+                                      <p:cBhvr>
+                                        <p:cTn id="20" dur="1" fill="hold"/>
+                                        <p:tgtEl>
+                                          <p:spTgt spid="6"/>
+                                        </p:tgtEl>
+                                      </p:cBhvr>
+                                    </p:cmd>
+                                  </p:childTnLst>
+                                </p:cTn>
+                              </p:par>
+                            </p:childTnLst>
+                          </p:cTn>
+                        </p:par>
+                      </p:childTnLst>
+                    </p:cTn>
+                  </p:par>
+                </p:childTnLst>
+              </p:cTn>
+              <p:nextCondLst>
+                <p:cond evt="onClick" delay="0">
+                  <p:tgtEl>
+                    <p:spTgt spid="6"/>
+                  </p:tgtEl>
+                </p:cond>
+              </p:nextCondLst>
+            </p:seq>
+            <p:video>
+              <p:cMediaNode vol="80000">
+                <p:cTn id="21" fill="hold" display="0">
+                  <p:stCondLst>
+                    <p:cond delay="indefinite"/>
+                  </p:stCondLst>
+                </p:cTn>
+                <p:tgtEl>
+                  <p:spTgt spid="7"/>
+                </p:tgtEl>
+              </p:cMediaNode>
+            </p:video>
+            <p:seq concurrent="1" nextAc="seek">
+              <p:cTn id="22" restart="whenNotActive" fill="hold" evtFilter="cancelBubble" nodeType="interactiveSeq">
+                <p:stCondLst>
+                  <p:cond evt="onClick" delay="0">
+                    <p:tgtEl>
+                      <p:spTgt spid="7"/>
+                    </p:tgtEl>
+                  </p:cond>
+                </p:stCondLst>
+                <p:endSync evt="end" delay="0">
+                  <p:rtn val="all"/>
+                </p:endSync>
+                <p:childTnLst>
+                  <p:par>
+                    <p:cTn id="23" fill="hold">
+                      <p:stCondLst>
+                        <p:cond delay="0"/>
+                      </p:stCondLst>
+                      <p:childTnLst>
+                        <p:par>
+                          <p:cTn id="24" fill="hold">
+                            <p:stCondLst>
+                              <p:cond delay="0"/>
+                            </p:stCondLst>
+                            <p:childTnLst>
+                              <p:par>
+                                <p:cTn id="25" presetID="2" presetClass="mediacall" presetSubtype="0" fill="hold" nodeType="clickEffect">
+                                  <p:stCondLst>
+                                    <p:cond delay="0"/>
+                                  </p:stCondLst>
+                                  <p:childTnLst>
+                                    <p:cmd type="call" cmd="togglePause">
+                                      <p:cBhvr>
+                                        <p:cTn id="26" dur="1" fill="hold"/>
+                                        <p:tgtEl>
+                                          <p:spTgt spid="7"/>
+                                        </p:tgtEl>
+                                      </p:cBhvr>
+                                    </p:cmd>
+                                  </p:childTnLst>
+                                </p:cTn>
+                              </p:par>
+                            </p:childTnLst>
+                          </p:cTn>
+                        </p:par>
+                      </p:childTnLst>
+                    </p:cTn>
+                  </p:par>
+                </p:childTnLst>
+              </p:cTn>
+              <p:nextCondLst>
+                <p:cond evt="onClick" delay="0">
+                  <p:tgtEl>
+                    <p:spTgt spid="7"/>
+                  </p:tgtEl>
+                </p:cond>
+              </p:nextCondLst>
+            </p:seq>
+            <p:video>
+              <p:cMediaNode vol="80000">
+                <p:cTn id="27" fill="hold" display="0">
+                  <p:stCondLst>
+                    <p:cond delay="indefinite"/>
+                  </p:stCondLst>
+                </p:cTn>
+                <p:tgtEl>
+                  <p:spTgt spid="8"/>
+                </p:tgtEl>
+              </p:cMediaNode>
+            </p:video>
+            <p:seq concurrent="1" nextAc="seek">
+              <p:cTn id="28" restart="whenNotActive" fill="hold" evtFilter="cancelBubble" nodeType="interactiveSeq">
+                <p:stCondLst>
+                  <p:cond evt="onClick" delay="0">
+                    <p:tgtEl>
+                      <p:spTgt spid="8"/>
+                    </p:tgtEl>
+                  </p:cond>
+                </p:stCondLst>
+                <p:endSync evt="end" delay="0">
+                  <p:rtn val="all"/>
+                </p:endSync>
+                <p:childTnLst>
+                  <p:par>
+                    <p:cTn id="29" fill="hold">
+                      <p:stCondLst>
+                        <p:cond delay="0"/>
+                      </p:stCondLst>
+                      <p:childTnLst>
+                        <p:par>
+                          <p:cTn id="30" fill="hold">
+                            <p:stCondLst>
+                              <p:cond delay="0"/>
+                            </p:stCondLst>
+                            <p:childTnLst>
+                              <p:par>
+                                <p:cTn id="31" presetID="2" presetClass="mediacall" presetSubtype="0" fill="hold" nodeType="clickEffect">
+                                  <p:stCondLst>
+                                    <p:cond delay="0"/>
+                                  </p:stCondLst>
+                                  <p:childTnLst>
+                                    <p:cmd type="call" cmd="togglePause">
+                                      <p:cBhvr>
+                                        <p:cTn id="32" dur="1" fill="hold"/>
+                                        <p:tgtEl>
+                                          <p:spTgt spid="8"/>
+                                        </p:tgtEl>
+                                      </p:cBhvr>
+                                    </p:cmd>
+                                  </p:childTnLst>
+                                </p:cTn>
+                              </p:par>
+                            </p:childTnLst>
+                          </p:cTn>
+                        </p:par>
+                      </p:childTnLst>
+                    </p:cTn>
+                  </p:par>
+                </p:childTnLst>
+              </p:cTn>
+              <p:nextCondLst>
+                <p:cond evt="onClick" delay="0">
+                  <p:tgtEl>
+                    <p:spTgt spid="8"/>
+                  </p:tgtEl>
+                </p:cond>
+              </p:nextCondLst>
+            </p:seq>
+          </p:childTnLst>
+        </p:cTn>
+      </p:par>
+    </p:tnLst>
+  </p:timing>
+</p:sld>
+</file>
+
+<file path=ppt/slides/slide28.xml><?xml version="1.0" encoding="utf-8"?>
+<p:sld xmlns:a="http://schemas.openxmlformats.org/drawingml/2006/main" xmlns:r="http://schemas.openxmlformats.org/officeDocument/2006/relationships" xmlns:p="http://schemas.openxmlformats.org/presentationml/2006/main">
+  <p:cSld>
+    <p:spTree>
+      <p:nvGrpSpPr>
+        <p:cNvPr id="1" name=""/>
+        <p:cNvGrpSpPr/>
+        <p:nvPr/>
+      </p:nvGrpSpPr>
+      <p:grpSpPr>
+        <a:xfrm>
+          <a:off x="0" y="0"/>
+          <a:ext cx="0" cy="0"/>
+          <a:chOff x="0" y="0"/>
+          <a:chExt cx="0" cy="0"/>
+        </a:xfrm>
+      </p:grpSpPr>
+      <p:sp>
+        <p:nvSpPr>
+          <p:cNvPr id="2" name="Título 1">
+            <a:extLst>
+              <a:ext uri="{FF2B5EF4-FFF2-40B4-BE49-F238E27FC236}">
+                <a16:creationId xmlns:a16="http://schemas.microsoft.com/office/drawing/2014/main" id="{FDD9C407-561A-4F81-B4C3-F8BFC1EF090C}"/>
+              </a:ext>
+            </a:extLst>
+          </p:cNvPr>
+          <p:cNvSpPr>
+            <a:spLocks noGrp="1"/>
+          </p:cNvSpPr>
+          <p:nvPr>
+            <p:ph type="title"/>
+          </p:nvPr>
+        </p:nvSpPr>
+        <p:spPr/>
+        <p:txBody>
+          <a:bodyPr/>
+          <a:lstStyle/>
+          <a:p>
+            <a:r>
+              <a:rPr lang="es-MX" dirty="0"/>
+              <a:t>Valores y vectores propios</a:t>
+            </a:r>
+            <a:endParaRPr lang="es-CO" dirty="0"/>
+          </a:p>
+        </p:txBody>
+      </p:sp>
+    </p:spTree>
+    <p:extLst>
+      <p:ext uri="{BB962C8B-B14F-4D97-AF65-F5344CB8AC3E}">
+        <p14:creationId xmlns:p14="http://schemas.microsoft.com/office/powerpoint/2010/main" val="1233775901"/>
+      </p:ext>
+    </p:extLst>
+  </p:cSld>
+  <p:clrMapOvr>
+    <a:masterClrMapping/>
+  </p:clrMapOvr>
+</p:sld>
+</file>
+
+<file path=ppt/slides/slide29.xml><?xml version="1.0" encoding="utf-8"?>
+<p:sld xmlns:a="http://schemas.openxmlformats.org/drawingml/2006/main" xmlns:r="http://schemas.openxmlformats.org/officeDocument/2006/relationships" xmlns:p="http://schemas.openxmlformats.org/presentationml/2006/main">
+  <p:cSld>
+    <p:spTree>
+      <p:nvGrpSpPr>
+        <p:cNvPr id="1" name=""/>
+        <p:cNvGrpSpPr/>
+        <p:nvPr/>
+      </p:nvGrpSpPr>
+      <p:grpSpPr>
+        <a:xfrm>
+          <a:off x="0" y="0"/>
+          <a:ext cx="0" cy="0"/>
+          <a:chOff x="0" y="0"/>
+          <a:chExt cx="0" cy="0"/>
+        </a:xfrm>
+      </p:grpSpPr>
+      <p:pic>
+        <p:nvPicPr>
+          <p:cNvPr id="5" name="Imagen 4">
+            <a:extLst>
+              <a:ext uri="{FF2B5EF4-FFF2-40B4-BE49-F238E27FC236}">
+                <a16:creationId xmlns:a16="http://schemas.microsoft.com/office/drawing/2014/main" id="{81A2D2EC-9FB9-4463-9425-AD5919511F46}"/>
+              </a:ext>
+            </a:extLst>
+          </p:cNvPr>
+          <p:cNvPicPr>
+            <a:picLocks noChangeAspect="1"/>
+          </p:cNvPicPr>
+          <p:nvPr/>
+        </p:nvPicPr>
+        <p:blipFill>
+          <a:blip r:embed="rId2"/>
+          <a:stretch>
+            <a:fillRect/>
+          </a:stretch>
+        </p:blipFill>
+        <p:spPr>
+          <a:xfrm>
+            <a:off x="1924050" y="287915"/>
+            <a:ext cx="8343900" cy="2790825"/>
+          </a:xfrm>
+          <a:prstGeom prst="rect">
+            <a:avLst/>
+          </a:prstGeom>
+        </p:spPr>
+      </p:pic>
+      <p:pic>
+        <p:nvPicPr>
+          <p:cNvPr id="7" name="Imagen 6">
+            <a:extLst>
+              <a:ext uri="{FF2B5EF4-FFF2-40B4-BE49-F238E27FC236}">
+                <a16:creationId xmlns:a16="http://schemas.microsoft.com/office/drawing/2014/main" id="{71BF8FB9-594F-45F7-B563-3BA40FF735A4}"/>
+              </a:ext>
+            </a:extLst>
+          </p:cNvPr>
+          <p:cNvPicPr>
+            <a:picLocks noChangeAspect="1"/>
+          </p:cNvPicPr>
+          <p:nvPr/>
+        </p:nvPicPr>
+        <p:blipFill>
+          <a:blip r:embed="rId3"/>
+          <a:stretch>
+            <a:fillRect/>
+          </a:stretch>
+        </p:blipFill>
+        <p:spPr>
+          <a:xfrm>
+            <a:off x="2076450" y="3183690"/>
+            <a:ext cx="8039100" cy="1390650"/>
+          </a:xfrm>
+          <a:prstGeom prst="rect">
+            <a:avLst/>
+          </a:prstGeom>
+        </p:spPr>
+      </p:pic>
+      <p:pic>
+        <p:nvPicPr>
+          <p:cNvPr id="9" name="Imagen 8">
+            <a:extLst>
+              <a:ext uri="{FF2B5EF4-FFF2-40B4-BE49-F238E27FC236}">
+                <a16:creationId xmlns:a16="http://schemas.microsoft.com/office/drawing/2014/main" id="{AA3C45FC-EBC3-4C6A-B9F9-FE43205E6BE3}"/>
+              </a:ext>
+            </a:extLst>
+          </p:cNvPr>
+          <p:cNvPicPr>
+            <a:picLocks noChangeAspect="1"/>
+          </p:cNvPicPr>
+          <p:nvPr/>
+        </p:nvPicPr>
+        <p:blipFill>
+          <a:blip r:embed="rId4"/>
+          <a:stretch>
+            <a:fillRect/>
+          </a:stretch>
+        </p:blipFill>
+        <p:spPr>
+          <a:xfrm>
+            <a:off x="1857375" y="4679290"/>
+            <a:ext cx="8477250" cy="1657350"/>
+          </a:xfrm>
+          <a:prstGeom prst="rect">
+            <a:avLst/>
+          </a:prstGeom>
+        </p:spPr>
+      </p:pic>
+    </p:spTree>
+    <p:extLst>
+      <p:ext uri="{BB962C8B-B14F-4D97-AF65-F5344CB8AC3E}">
+        <p14:creationId xmlns:p14="http://schemas.microsoft.com/office/powerpoint/2010/main" val="1040035025"/>
+      </p:ext>
+    </p:extLst>
+  </p:cSld>
+  <p:clrMapOvr>
+    <a:masterClrMapping/>
+  </p:clrMapOvr>
+  <p:timing>
+    <p:tnLst>
+      <p:par>
+        <p:cTn id="1" dur="indefinite" restart="never" nodeType="tmRoot">
+          <p:childTnLst>
+            <p:seq concurrent="1" nextAc="seek">
+              <p:cTn id="2" dur="indefinite" nodeType="mainSeq">
+                <p:childTnLst>
+                  <p:par>
+                    <p:cTn id="3" fill="hold">
+                      <p:stCondLst>
+                        <p:cond delay="indefinite"/>
+                      </p:stCondLst>
+                      <p:childTnLst>
+                        <p:par>
+                          <p:cTn id="4" fill="hold">
+                            <p:stCondLst>
+                              <p:cond delay="0"/>
+                            </p:stCondLst>
+                            <p:childTnLst>
+                              <p:par>
+                                <p:cTn id="5" presetID="1" presetClass="entr" presetSubtype="0" fill="hold" nodeType="clickEffect">
+                                  <p:stCondLst>
+                                    <p:cond delay="0"/>
+                                  </p:stCondLst>
+                                  <p:childTnLst>
+                                    <p:set>
+                                      <p:cBhvr>
+                                        <p:cTn id="6" dur="1" fill="hold">
+                                          <p:stCondLst>
+                                            <p:cond delay="0"/>
+                                          </p:stCondLst>
+                                        </p:cTn>
+                                        <p:tgtEl>
+                                          <p:spTgt spid="7"/>
+                                        </p:tgtEl>
+                                        <p:attrNameLst>
+                                          <p:attrName>style.visibility</p:attrName>
+                                        </p:attrNameLst>
+                                      </p:cBhvr>
+                                      <p:to>
+                                        <p:strVal val="visible"/>
+                                      </p:to>
+                                    </p:set>
+                                  </p:childTnLst>
+                                </p:cTn>
+                              </p:par>
+                            </p:childTnLst>
+                          </p:cTn>
+                        </p:par>
+                      </p:childTnLst>
+                    </p:cTn>
+                  </p:par>
+                  <p:par>
+                    <p:cTn id="7" fill="hold">
+                      <p:stCondLst>
+                        <p:cond delay="indefinite"/>
+                      </p:stCondLst>
+                      <p:childTnLst>
+                        <p:par>
+                          <p:cTn id="8" fill="hold">
+                            <p:stCondLst>
+                              <p:cond delay="0"/>
+                            </p:stCondLst>
+                            <p:childTnLst>
+                              <p:par>
+                                <p:cTn id="9" presetID="1" presetClass="entr" presetSubtype="0" fill="hold" nodeType="clickEffect">
+                                  <p:stCondLst>
+                                    <p:cond delay="0"/>
+                                  </p:stCondLst>
+                                  <p:childTnLst>
+                                    <p:set>
+                                      <p:cBhvr>
+                                        <p:cTn id="10" dur="1" fill="hold">
+                                          <p:stCondLst>
+                                            <p:cond delay="0"/>
+                                          </p:stCondLst>
+                                        </p:cTn>
+                                        <p:tgtEl>
+                                          <p:spTgt spid="9"/>
+                                        </p:tgtEl>
+                                        <p:attrNameLst>
+                                          <p:attrName>style.visibility</p:attrName>
+                                        </p:attrNameLst>
+                                      </p:cBhvr>
+                                      <p:to>
+                                        <p:strVal val="visible"/>
+                                      </p:to>
+                                    </p:set>
+                                  </p:childTnLst>
+                                </p:cTn>
+                              </p:par>
+                            </p:childTnLst>
+                          </p:cTn>
+                        </p:par>
+                      </p:childTnLst>
+                    </p:cTn>
+                  </p:par>
+                </p:childTnLst>
+              </p:cTn>
+              <p:prevCondLst>
+                <p:cond evt="onPrev" delay="0">
+                  <p:tgtEl>
+                    <p:sldTgt/>
+                  </p:tgtEl>
+                </p:cond>
+              </p:prevCondLst>
+              <p:nextCondLst>
+                <p:cond evt="onNext" delay="0">
+                  <p:tgtEl>
+                    <p:sldTgt/>
+                  </p:tgtEl>
+                </p:cond>
+              </p:nextCondLst>
+            </p:seq>
+          </p:childTnLst>
+        </p:cTn>
+      </p:par>
+    </p:tnLst>
+  </p:timing>
+</p:sld>
+</file>
+
 <file path=ppt/slides/slide3.xml><?xml version="1.0" encoding="utf-8"?>
 <p:sld xmlns:a="http://schemas.openxmlformats.org/drawingml/2006/main" xmlns:r="http://schemas.openxmlformats.org/officeDocument/2006/relationships" xmlns:p="http://schemas.openxmlformats.org/presentationml/2006/main">
   <p:cSld>
@@ -6208,6 +8104,1138 @@
     <p:extLst>
       <p:ext uri="{BB962C8B-B14F-4D97-AF65-F5344CB8AC3E}">
         <p14:creationId xmlns:p14="http://schemas.microsoft.com/office/powerpoint/2010/main" val="341222016"/>
+      </p:ext>
+    </p:extLst>
+  </p:cSld>
+  <p:clrMapOvr>
+    <a:masterClrMapping/>
+  </p:clrMapOvr>
+</p:sld>
+</file>
+
+<file path=ppt/slides/slide30.xml><?xml version="1.0" encoding="utf-8"?>
+<p:sld xmlns:a="http://schemas.openxmlformats.org/drawingml/2006/main" xmlns:r="http://schemas.openxmlformats.org/officeDocument/2006/relationships" xmlns:p="http://schemas.openxmlformats.org/presentationml/2006/main">
+  <p:cSld>
+    <p:spTree>
+      <p:nvGrpSpPr>
+        <p:cNvPr id="1" name=""/>
+        <p:cNvGrpSpPr/>
+        <p:nvPr/>
+      </p:nvGrpSpPr>
+      <p:grpSpPr>
+        <a:xfrm>
+          <a:off x="0" y="0"/>
+          <a:ext cx="0" cy="0"/>
+          <a:chOff x="0" y="0"/>
+          <a:chExt cx="0" cy="0"/>
+        </a:xfrm>
+      </p:grpSpPr>
+      <p:sp>
+        <p:nvSpPr>
+          <p:cNvPr id="2" name="Título 1">
+            <a:extLst>
+              <a:ext uri="{FF2B5EF4-FFF2-40B4-BE49-F238E27FC236}">
+                <a16:creationId xmlns:a16="http://schemas.microsoft.com/office/drawing/2014/main" id="{DADAEE44-D483-43CB-8A34-F10EEA2A29EA}"/>
+              </a:ext>
+            </a:extLst>
+          </p:cNvPr>
+          <p:cNvSpPr>
+            <a:spLocks noGrp="1"/>
+          </p:cNvSpPr>
+          <p:nvPr>
+            <p:ph type="title"/>
+          </p:nvPr>
+        </p:nvSpPr>
+        <p:spPr/>
+        <p:txBody>
+          <a:bodyPr/>
+          <a:lstStyle/>
+          <a:p>
+            <a:r>
+              <a:rPr lang="es-MX" dirty="0"/>
+              <a:t>Funciones vectoriales</a:t>
+            </a:r>
+            <a:endParaRPr lang="es-CO" dirty="0"/>
+          </a:p>
+        </p:txBody>
+      </p:sp>
+    </p:spTree>
+    <p:extLst>
+      <p:ext uri="{BB962C8B-B14F-4D97-AF65-F5344CB8AC3E}">
+        <p14:creationId xmlns:p14="http://schemas.microsoft.com/office/powerpoint/2010/main" val="3184378148"/>
+      </p:ext>
+    </p:extLst>
+  </p:cSld>
+  <p:clrMapOvr>
+    <a:masterClrMapping/>
+  </p:clrMapOvr>
+</p:sld>
+</file>
+
+<file path=ppt/slides/slide31.xml><?xml version="1.0" encoding="utf-8"?>
+<p:sld xmlns:a="http://schemas.openxmlformats.org/drawingml/2006/main" xmlns:r="http://schemas.openxmlformats.org/officeDocument/2006/relationships" xmlns:p="http://schemas.openxmlformats.org/presentationml/2006/main">
+  <p:cSld>
+    <p:spTree>
+      <p:nvGrpSpPr>
+        <p:cNvPr id="1" name=""/>
+        <p:cNvGrpSpPr/>
+        <p:nvPr/>
+      </p:nvGrpSpPr>
+      <p:grpSpPr>
+        <a:xfrm>
+          <a:off x="0" y="0"/>
+          <a:ext cx="0" cy="0"/>
+          <a:chOff x="0" y="0"/>
+          <a:chExt cx="0" cy="0"/>
+        </a:xfrm>
+      </p:grpSpPr>
+      <p:pic>
+        <p:nvPicPr>
+          <p:cNvPr id="3" name="Imagen 2">
+            <a:extLst>
+              <a:ext uri="{FF2B5EF4-FFF2-40B4-BE49-F238E27FC236}">
+                <a16:creationId xmlns:a16="http://schemas.microsoft.com/office/drawing/2014/main" id="{422357CA-3009-4092-9A41-46765D79E892}"/>
+              </a:ext>
+            </a:extLst>
+          </p:cNvPr>
+          <p:cNvPicPr>
+            <a:picLocks noChangeAspect="1"/>
+          </p:cNvPicPr>
+          <p:nvPr/>
+        </p:nvPicPr>
+        <p:blipFill>
+          <a:blip r:embed="rId2"/>
+          <a:stretch>
+            <a:fillRect/>
+          </a:stretch>
+        </p:blipFill>
+        <p:spPr>
+          <a:xfrm>
+            <a:off x="1011382" y="2177935"/>
+            <a:ext cx="5228965" cy="3362842"/>
+          </a:xfrm>
+          <a:prstGeom prst="rect">
+            <a:avLst/>
+          </a:prstGeom>
+        </p:spPr>
+      </p:pic>
+      <p:sp>
+        <p:nvSpPr>
+          <p:cNvPr id="4" name="CuadroTexto 3">
+            <a:extLst>
+              <a:ext uri="{FF2B5EF4-FFF2-40B4-BE49-F238E27FC236}">
+                <a16:creationId xmlns:a16="http://schemas.microsoft.com/office/drawing/2014/main" id="{43D1B97B-9E9F-489B-8F08-EE5D06AB43B8}"/>
+              </a:ext>
+            </a:extLst>
+          </p:cNvPr>
+          <p:cNvSpPr txBox="1"/>
+          <p:nvPr/>
+        </p:nvSpPr>
+        <p:spPr>
+          <a:xfrm>
+            <a:off x="2088009" y="1808603"/>
+            <a:ext cx="3075709" cy="369332"/>
+          </a:xfrm>
+          <a:prstGeom prst="rect">
+            <a:avLst/>
+          </a:prstGeom>
+          <a:noFill/>
+        </p:spPr>
+        <p:txBody>
+          <a:bodyPr wrap="square" rtlCol="0">
+            <a:spAutoFit/>
+          </a:bodyPr>
+          <a:lstStyle/>
+          <a:p>
+            <a:r>
+              <a:rPr lang="es-MX" dirty="0"/>
+              <a:t>Reducción de dimensionalidad</a:t>
+            </a:r>
+            <a:endParaRPr lang="es-CO" dirty="0"/>
+          </a:p>
+        </p:txBody>
+      </p:sp>
+      <p:pic>
+        <p:nvPicPr>
+          <p:cNvPr id="6" name="Imagen 5">
+            <a:extLst>
+              <a:ext uri="{FF2B5EF4-FFF2-40B4-BE49-F238E27FC236}">
+                <a16:creationId xmlns:a16="http://schemas.microsoft.com/office/drawing/2014/main" id="{153EA16D-A482-4B03-B0BF-4F07CE581920}"/>
+              </a:ext>
+            </a:extLst>
+          </p:cNvPr>
+          <p:cNvPicPr>
+            <a:picLocks noChangeAspect="1"/>
+          </p:cNvPicPr>
+          <p:nvPr/>
+        </p:nvPicPr>
+        <p:blipFill>
+          <a:blip r:embed="rId3"/>
+          <a:stretch>
+            <a:fillRect/>
+          </a:stretch>
+        </p:blipFill>
+        <p:spPr>
+          <a:xfrm>
+            <a:off x="7202847" y="2780535"/>
+            <a:ext cx="3977771" cy="2169693"/>
+          </a:xfrm>
+          <a:prstGeom prst="rect">
+            <a:avLst/>
+          </a:prstGeom>
+        </p:spPr>
+      </p:pic>
+      <p:sp>
+        <p:nvSpPr>
+          <p:cNvPr id="7" name="CuadroTexto 6">
+            <a:extLst>
+              <a:ext uri="{FF2B5EF4-FFF2-40B4-BE49-F238E27FC236}">
+                <a16:creationId xmlns:a16="http://schemas.microsoft.com/office/drawing/2014/main" id="{08B55081-FFD4-4A23-B563-292C52F401A8}"/>
+              </a:ext>
+            </a:extLst>
+          </p:cNvPr>
+          <p:cNvSpPr txBox="1"/>
+          <p:nvPr/>
+        </p:nvSpPr>
+        <p:spPr>
+          <a:xfrm>
+            <a:off x="7720379" y="2119745"/>
+            <a:ext cx="2942706" cy="646331"/>
+          </a:xfrm>
+          <a:prstGeom prst="rect">
+            <a:avLst/>
+          </a:prstGeom>
+          <a:noFill/>
+        </p:spPr>
+        <p:txBody>
+          <a:bodyPr wrap="square" rtlCol="0">
+            <a:spAutoFit/>
+          </a:bodyPr>
+          <a:lstStyle/>
+          <a:p>
+            <a:r>
+              <a:rPr lang="es-MX" dirty="0"/>
+              <a:t>Sistemas de recomendación (factorización de matrices)</a:t>
+            </a:r>
+            <a:endParaRPr lang="es-CO" dirty="0"/>
+          </a:p>
+        </p:txBody>
+      </p:sp>
+    </p:spTree>
+    <p:extLst>
+      <p:ext uri="{BB962C8B-B14F-4D97-AF65-F5344CB8AC3E}">
+        <p14:creationId xmlns:p14="http://schemas.microsoft.com/office/powerpoint/2010/main" val="2234385149"/>
+      </p:ext>
+    </p:extLst>
+  </p:cSld>
+  <p:clrMapOvr>
+    <a:masterClrMapping/>
+  </p:clrMapOvr>
+  <p:timing>
+    <p:tnLst>
+      <p:par>
+        <p:cTn id="1" dur="indefinite" restart="never" nodeType="tmRoot">
+          <p:childTnLst>
+            <p:seq concurrent="1" nextAc="seek">
+              <p:cTn id="2" dur="indefinite" nodeType="mainSeq">
+                <p:childTnLst>
+                  <p:par>
+                    <p:cTn id="3" fill="hold">
+                      <p:stCondLst>
+                        <p:cond delay="indefinite"/>
+                      </p:stCondLst>
+                      <p:childTnLst>
+                        <p:par>
+                          <p:cTn id="4" fill="hold">
+                            <p:stCondLst>
+                              <p:cond delay="0"/>
+                            </p:stCondLst>
+                            <p:childTnLst>
+                              <p:par>
+                                <p:cTn id="5" presetID="1" presetClass="entr" presetSubtype="0" fill="hold" nodeType="clickEffect">
+                                  <p:stCondLst>
+                                    <p:cond delay="0"/>
+                                  </p:stCondLst>
+                                  <p:childTnLst>
+                                    <p:set>
+                                      <p:cBhvr>
+                                        <p:cTn id="6" dur="1" fill="hold">
+                                          <p:stCondLst>
+                                            <p:cond delay="0"/>
+                                          </p:stCondLst>
+                                        </p:cTn>
+                                        <p:tgtEl>
+                                          <p:spTgt spid="6"/>
+                                        </p:tgtEl>
+                                        <p:attrNameLst>
+                                          <p:attrName>style.visibility</p:attrName>
+                                        </p:attrNameLst>
+                                      </p:cBhvr>
+                                      <p:to>
+                                        <p:strVal val="visible"/>
+                                      </p:to>
+                                    </p:set>
+                                  </p:childTnLst>
+                                </p:cTn>
+                              </p:par>
+                              <p:par>
+                                <p:cTn id="7" presetID="1" presetClass="entr" presetSubtype="0" fill="hold" grpId="0" nodeType="withEffect">
+                                  <p:stCondLst>
+                                    <p:cond delay="0"/>
+                                  </p:stCondLst>
+                                  <p:childTnLst>
+                                    <p:set>
+                                      <p:cBhvr>
+                                        <p:cTn id="8" dur="1" fill="hold">
+                                          <p:stCondLst>
+                                            <p:cond delay="0"/>
+                                          </p:stCondLst>
+                                        </p:cTn>
+                                        <p:tgtEl>
+                                          <p:spTgt spid="7"/>
+                                        </p:tgtEl>
+                                        <p:attrNameLst>
+                                          <p:attrName>style.visibility</p:attrName>
+                                        </p:attrNameLst>
+                                      </p:cBhvr>
+                                      <p:to>
+                                        <p:strVal val="visible"/>
+                                      </p:to>
+                                    </p:set>
+                                  </p:childTnLst>
+                                </p:cTn>
+                              </p:par>
+                            </p:childTnLst>
+                          </p:cTn>
+                        </p:par>
+                      </p:childTnLst>
+                    </p:cTn>
+                  </p:par>
+                </p:childTnLst>
+              </p:cTn>
+              <p:prevCondLst>
+                <p:cond evt="onPrev" delay="0">
+                  <p:tgtEl>
+                    <p:sldTgt/>
+                  </p:tgtEl>
+                </p:cond>
+              </p:prevCondLst>
+              <p:nextCondLst>
+                <p:cond evt="onNext" delay="0">
+                  <p:tgtEl>
+                    <p:sldTgt/>
+                  </p:tgtEl>
+                </p:cond>
+              </p:nextCondLst>
+            </p:seq>
+          </p:childTnLst>
+        </p:cTn>
+      </p:par>
+    </p:tnLst>
+    <p:bldLst>
+      <p:bldP spid="7" grpId="0"/>
+    </p:bldLst>
+  </p:timing>
+</p:sld>
+</file>
+
+<file path=ppt/slides/slide32.xml><?xml version="1.0" encoding="utf-8"?>
+<p:sld xmlns:a="http://schemas.openxmlformats.org/drawingml/2006/main" xmlns:r="http://schemas.openxmlformats.org/officeDocument/2006/relationships" xmlns:p="http://schemas.openxmlformats.org/presentationml/2006/main">
+  <p:cSld>
+    <p:spTree>
+      <p:nvGrpSpPr>
+        <p:cNvPr id="1" name=""/>
+        <p:cNvGrpSpPr/>
+        <p:nvPr/>
+      </p:nvGrpSpPr>
+      <p:grpSpPr>
+        <a:xfrm>
+          <a:off x="0" y="0"/>
+          <a:ext cx="0" cy="0"/>
+          <a:chOff x="0" y="0"/>
+          <a:chExt cx="0" cy="0"/>
+        </a:xfrm>
+      </p:grpSpPr>
+      <p:sp>
+        <p:nvSpPr>
+          <p:cNvPr id="4" name="CuadroTexto 3">
+            <a:extLst>
+              <a:ext uri="{FF2B5EF4-FFF2-40B4-BE49-F238E27FC236}">
+                <a16:creationId xmlns:a16="http://schemas.microsoft.com/office/drawing/2014/main" id="{FA8965B7-F8BD-4B3B-BA21-604EDBE67502}"/>
+              </a:ext>
+            </a:extLst>
+          </p:cNvPr>
+          <p:cNvSpPr txBox="1"/>
+          <p:nvPr/>
+        </p:nvSpPr>
+        <p:spPr>
+          <a:xfrm>
+            <a:off x="365760" y="199505"/>
+            <a:ext cx="3640975" cy="369332"/>
+          </a:xfrm>
+          <a:prstGeom prst="rect">
+            <a:avLst/>
+          </a:prstGeom>
+          <a:noFill/>
+        </p:spPr>
+        <p:txBody>
+          <a:bodyPr wrap="square" rtlCol="0">
+            <a:spAutoFit/>
+          </a:bodyPr>
+          <a:lstStyle/>
+          <a:p>
+            <a:r>
+              <a:rPr lang="es-MX" dirty="0"/>
+              <a:t>Notación:</a:t>
+            </a:r>
+            <a:endParaRPr lang="es-CO" dirty="0"/>
+          </a:p>
+        </p:txBody>
+      </p:sp>
+      <p:pic>
+        <p:nvPicPr>
+          <p:cNvPr id="6" name="Imagen 5">
+            <a:extLst>
+              <a:ext uri="{FF2B5EF4-FFF2-40B4-BE49-F238E27FC236}">
+                <a16:creationId xmlns:a16="http://schemas.microsoft.com/office/drawing/2014/main" id="{76B9C307-34CA-42F9-8805-D4600CB8337E}"/>
+              </a:ext>
+            </a:extLst>
+          </p:cNvPr>
+          <p:cNvPicPr>
+            <a:picLocks noChangeAspect="1"/>
+          </p:cNvPicPr>
+          <p:nvPr/>
+        </p:nvPicPr>
+        <p:blipFill>
+          <a:blip r:embed="rId2"/>
+          <a:stretch>
+            <a:fillRect/>
+          </a:stretch>
+        </p:blipFill>
+        <p:spPr>
+          <a:xfrm>
+            <a:off x="4086225" y="638175"/>
+            <a:ext cx="4019550" cy="5581650"/>
+          </a:xfrm>
+          <a:prstGeom prst="rect">
+            <a:avLst/>
+          </a:prstGeom>
+        </p:spPr>
+      </p:pic>
+    </p:spTree>
+    <p:extLst>
+      <p:ext uri="{BB962C8B-B14F-4D97-AF65-F5344CB8AC3E}">
+        <p14:creationId xmlns:p14="http://schemas.microsoft.com/office/powerpoint/2010/main" val="1436160496"/>
+      </p:ext>
+    </p:extLst>
+  </p:cSld>
+  <p:clrMapOvr>
+    <a:masterClrMapping/>
+  </p:clrMapOvr>
+</p:sld>
+</file>
+
+<file path=ppt/slides/slide33.xml><?xml version="1.0" encoding="utf-8"?>
+<p:sld xmlns:a="http://schemas.openxmlformats.org/drawingml/2006/main" xmlns:r="http://schemas.openxmlformats.org/officeDocument/2006/relationships" xmlns:p="http://schemas.openxmlformats.org/presentationml/2006/main">
+  <p:cSld>
+    <p:spTree>
+      <p:nvGrpSpPr>
+        <p:cNvPr id="1" name=""/>
+        <p:cNvGrpSpPr/>
+        <p:nvPr/>
+      </p:nvGrpSpPr>
+      <p:grpSpPr>
+        <a:xfrm>
+          <a:off x="0" y="0"/>
+          <a:ext cx="0" cy="0"/>
+          <a:chOff x="0" y="0"/>
+          <a:chExt cx="0" cy="0"/>
+        </a:xfrm>
+      </p:grpSpPr>
+      <p:pic>
+        <p:nvPicPr>
+          <p:cNvPr id="5" name="Imagen 4">
+            <a:extLst>
+              <a:ext uri="{FF2B5EF4-FFF2-40B4-BE49-F238E27FC236}">
+                <a16:creationId xmlns:a16="http://schemas.microsoft.com/office/drawing/2014/main" id="{10A60183-BDF9-4222-853F-5B40D307D984}"/>
+              </a:ext>
+            </a:extLst>
+          </p:cNvPr>
+          <p:cNvPicPr>
+            <a:picLocks noChangeAspect="1"/>
+          </p:cNvPicPr>
+          <p:nvPr/>
+        </p:nvPicPr>
+        <p:blipFill>
+          <a:blip r:embed="rId2"/>
+          <a:stretch>
+            <a:fillRect/>
+          </a:stretch>
+        </p:blipFill>
+        <p:spPr>
+          <a:xfrm>
+            <a:off x="1232189" y="3067050"/>
+            <a:ext cx="6153150" cy="723900"/>
+          </a:xfrm>
+          <a:prstGeom prst="rect">
+            <a:avLst/>
+          </a:prstGeom>
+        </p:spPr>
+      </p:pic>
+      <p:sp>
+        <p:nvSpPr>
+          <p:cNvPr id="6" name="CuadroTexto 5">
+            <a:extLst>
+              <a:ext uri="{FF2B5EF4-FFF2-40B4-BE49-F238E27FC236}">
+                <a16:creationId xmlns:a16="http://schemas.microsoft.com/office/drawing/2014/main" id="{678A784A-0F6B-4E68-A5B4-3FA72046C175}"/>
+              </a:ext>
+            </a:extLst>
+          </p:cNvPr>
+          <p:cNvSpPr txBox="1"/>
+          <p:nvPr/>
+        </p:nvSpPr>
+        <p:spPr>
+          <a:xfrm>
+            <a:off x="971203" y="1005840"/>
+            <a:ext cx="10249593" cy="1200329"/>
+          </a:xfrm>
+          <a:prstGeom prst="rect">
+            <a:avLst/>
+          </a:prstGeom>
+          <a:noFill/>
+        </p:spPr>
+        <p:txBody>
+          <a:bodyPr wrap="square" rtlCol="0">
+            <a:spAutoFit/>
+          </a:bodyPr>
+          <a:lstStyle/>
+          <a:p>
+            <a:r>
+              <a:rPr lang="es-MX" dirty="0"/>
+              <a:t>Una función con valores vectoriales, es decir, una </a:t>
+            </a:r>
+            <a:r>
+              <a:rPr lang="es-MX" b="1" dirty="0"/>
+              <a:t>función vectorial</a:t>
+            </a:r>
+            <a:r>
+              <a:rPr lang="es-MX" dirty="0"/>
+              <a:t>, es simple mente una función cuyo dominio es un conjunto de números reales y cuyo rango es un con junto de vectores. Si , y son las componentes del vector r(t), entonces </a:t>
+            </a:r>
+            <a:r>
+              <a:rPr lang="es-MX" b="1" dirty="0"/>
+              <a:t>f(t), g(t), y h(t)</a:t>
+            </a:r>
+            <a:r>
+              <a:rPr lang="es-MX" dirty="0"/>
+              <a:t> son funciones de valores reales llamadas </a:t>
+            </a:r>
+            <a:r>
+              <a:rPr lang="es-MX" b="1" dirty="0"/>
+              <a:t>funciones coordenadas</a:t>
+            </a:r>
+            <a:r>
+              <a:rPr lang="es-MX" dirty="0"/>
+              <a:t> de r y podemos escribir:</a:t>
+            </a:r>
+            <a:endParaRPr lang="es-CO" dirty="0"/>
+          </a:p>
+        </p:txBody>
+      </p:sp>
+    </p:spTree>
+    <p:extLst>
+      <p:ext uri="{BB962C8B-B14F-4D97-AF65-F5344CB8AC3E}">
+        <p14:creationId xmlns:p14="http://schemas.microsoft.com/office/powerpoint/2010/main" val="181795783"/>
+      </p:ext>
+    </p:extLst>
+  </p:cSld>
+  <p:clrMapOvr>
+    <a:masterClrMapping/>
+  </p:clrMapOvr>
+</p:sld>
+</file>
+
+<file path=ppt/slides/slide34.xml><?xml version="1.0" encoding="utf-8"?>
+<p:sld xmlns:a="http://schemas.openxmlformats.org/drawingml/2006/main" xmlns:r="http://schemas.openxmlformats.org/officeDocument/2006/relationships" xmlns:p="http://schemas.openxmlformats.org/presentationml/2006/main">
+  <p:cSld>
+    <p:spTree>
+      <p:nvGrpSpPr>
+        <p:cNvPr id="1" name=""/>
+        <p:cNvGrpSpPr/>
+        <p:nvPr/>
+      </p:nvGrpSpPr>
+      <p:grpSpPr>
+        <a:xfrm>
+          <a:off x="0" y="0"/>
+          <a:ext cx="0" cy="0"/>
+          <a:chOff x="0" y="0"/>
+          <a:chExt cx="0" cy="0"/>
+        </a:xfrm>
+      </p:grpSpPr>
+      <p:pic>
+        <p:nvPicPr>
+          <p:cNvPr id="5" name="Imagen 4">
+            <a:extLst>
+              <a:ext uri="{FF2B5EF4-FFF2-40B4-BE49-F238E27FC236}">
+                <a16:creationId xmlns:a16="http://schemas.microsoft.com/office/drawing/2014/main" id="{080017AC-F7BD-4FC3-B816-8079391C2FE3}"/>
+              </a:ext>
+            </a:extLst>
+          </p:cNvPr>
+          <p:cNvPicPr>
+            <a:picLocks noChangeAspect="1"/>
+          </p:cNvPicPr>
+          <p:nvPr/>
+        </p:nvPicPr>
+        <p:blipFill>
+          <a:blip r:embed="rId2"/>
+          <a:stretch>
+            <a:fillRect/>
+          </a:stretch>
+        </p:blipFill>
+        <p:spPr>
+          <a:xfrm>
+            <a:off x="638175" y="247217"/>
+            <a:ext cx="10915650" cy="3038475"/>
+          </a:xfrm>
+          <a:prstGeom prst="rect">
+            <a:avLst/>
+          </a:prstGeom>
+        </p:spPr>
+      </p:pic>
+      <p:pic>
+        <p:nvPicPr>
+          <p:cNvPr id="7" name="Imagen 6">
+            <a:extLst>
+              <a:ext uri="{FF2B5EF4-FFF2-40B4-BE49-F238E27FC236}">
+                <a16:creationId xmlns:a16="http://schemas.microsoft.com/office/drawing/2014/main" id="{B79C2777-7A6B-4CB4-AB9E-6C36D9C8C50C}"/>
+              </a:ext>
+            </a:extLst>
+          </p:cNvPr>
+          <p:cNvPicPr>
+            <a:picLocks noChangeAspect="1"/>
+          </p:cNvPicPr>
+          <p:nvPr/>
+        </p:nvPicPr>
+        <p:blipFill>
+          <a:blip r:embed="rId3"/>
+          <a:stretch>
+            <a:fillRect/>
+          </a:stretch>
+        </p:blipFill>
+        <p:spPr>
+          <a:xfrm>
+            <a:off x="714375" y="3869228"/>
+            <a:ext cx="10763250" cy="2095500"/>
+          </a:xfrm>
+          <a:prstGeom prst="rect">
+            <a:avLst/>
+          </a:prstGeom>
+        </p:spPr>
+      </p:pic>
+    </p:spTree>
+    <p:extLst>
+      <p:ext uri="{BB962C8B-B14F-4D97-AF65-F5344CB8AC3E}">
+        <p14:creationId xmlns:p14="http://schemas.microsoft.com/office/powerpoint/2010/main" val="2604729645"/>
+      </p:ext>
+    </p:extLst>
+  </p:cSld>
+  <p:clrMapOvr>
+    <a:masterClrMapping/>
+  </p:clrMapOvr>
+  <p:timing>
+    <p:tnLst>
+      <p:par>
+        <p:cTn id="1" dur="indefinite" restart="never" nodeType="tmRoot">
+          <p:childTnLst>
+            <p:seq concurrent="1" nextAc="seek">
+              <p:cTn id="2" dur="indefinite" nodeType="mainSeq">
+                <p:childTnLst>
+                  <p:par>
+                    <p:cTn id="3" fill="hold">
+                      <p:stCondLst>
+                        <p:cond delay="indefinite"/>
+                      </p:stCondLst>
+                      <p:childTnLst>
+                        <p:par>
+                          <p:cTn id="4" fill="hold">
+                            <p:stCondLst>
+                              <p:cond delay="0"/>
+                            </p:stCondLst>
+                            <p:childTnLst>
+                              <p:par>
+                                <p:cTn id="5" presetID="1" presetClass="entr" presetSubtype="0" fill="hold" nodeType="clickEffect">
+                                  <p:stCondLst>
+                                    <p:cond delay="0"/>
+                                  </p:stCondLst>
+                                  <p:childTnLst>
+                                    <p:set>
+                                      <p:cBhvr>
+                                        <p:cTn id="6" dur="1" fill="hold">
+                                          <p:stCondLst>
+                                            <p:cond delay="0"/>
+                                          </p:stCondLst>
+                                        </p:cTn>
+                                        <p:tgtEl>
+                                          <p:spTgt spid="7"/>
+                                        </p:tgtEl>
+                                        <p:attrNameLst>
+                                          <p:attrName>style.visibility</p:attrName>
+                                        </p:attrNameLst>
+                                      </p:cBhvr>
+                                      <p:to>
+                                        <p:strVal val="visible"/>
+                                      </p:to>
+                                    </p:set>
+                                  </p:childTnLst>
+                                </p:cTn>
+                              </p:par>
+                            </p:childTnLst>
+                          </p:cTn>
+                        </p:par>
+                      </p:childTnLst>
+                    </p:cTn>
+                  </p:par>
+                </p:childTnLst>
+              </p:cTn>
+              <p:prevCondLst>
+                <p:cond evt="onPrev" delay="0">
+                  <p:tgtEl>
+                    <p:sldTgt/>
+                  </p:tgtEl>
+                </p:cond>
+              </p:prevCondLst>
+              <p:nextCondLst>
+                <p:cond evt="onNext" delay="0">
+                  <p:tgtEl>
+                    <p:sldTgt/>
+                  </p:tgtEl>
+                </p:cond>
+              </p:nextCondLst>
+            </p:seq>
+          </p:childTnLst>
+        </p:cTn>
+      </p:par>
+    </p:tnLst>
+  </p:timing>
+</p:sld>
+</file>
+
+<file path=ppt/slides/slide35.xml><?xml version="1.0" encoding="utf-8"?>
+<p:sld xmlns:a="http://schemas.openxmlformats.org/drawingml/2006/main" xmlns:r="http://schemas.openxmlformats.org/officeDocument/2006/relationships" xmlns:p="http://schemas.openxmlformats.org/presentationml/2006/main">
+  <p:cSld>
+    <p:spTree>
+      <p:nvGrpSpPr>
+        <p:cNvPr id="1" name=""/>
+        <p:cNvGrpSpPr/>
+        <p:nvPr/>
+      </p:nvGrpSpPr>
+      <p:grpSpPr>
+        <a:xfrm>
+          <a:off x="0" y="0"/>
+          <a:ext cx="0" cy="0"/>
+          <a:chOff x="0" y="0"/>
+          <a:chExt cx="0" cy="0"/>
+        </a:xfrm>
+      </p:grpSpPr>
+      <p:pic>
+        <p:nvPicPr>
+          <p:cNvPr id="5" name="Imagen 4">
+            <a:extLst>
+              <a:ext uri="{FF2B5EF4-FFF2-40B4-BE49-F238E27FC236}">
+                <a16:creationId xmlns:a16="http://schemas.microsoft.com/office/drawing/2014/main" id="{6BA6B58D-FC99-439C-BAC3-CBB5FD2B038B}"/>
+              </a:ext>
+            </a:extLst>
+          </p:cNvPr>
+          <p:cNvPicPr>
+            <a:picLocks noChangeAspect="1"/>
+          </p:cNvPicPr>
+          <p:nvPr/>
+        </p:nvPicPr>
+        <p:blipFill>
+          <a:blip r:embed="rId2"/>
+          <a:stretch>
+            <a:fillRect/>
+          </a:stretch>
+        </p:blipFill>
+        <p:spPr>
+          <a:xfrm>
+            <a:off x="1035423" y="0"/>
+            <a:ext cx="10121153" cy="6858000"/>
+          </a:xfrm>
+          <a:prstGeom prst="rect">
+            <a:avLst/>
+          </a:prstGeom>
+        </p:spPr>
+      </p:pic>
+    </p:spTree>
+    <p:extLst>
+      <p:ext uri="{BB962C8B-B14F-4D97-AF65-F5344CB8AC3E}">
+        <p14:creationId xmlns:p14="http://schemas.microsoft.com/office/powerpoint/2010/main" val="1132805411"/>
+      </p:ext>
+    </p:extLst>
+  </p:cSld>
+  <p:clrMapOvr>
+    <a:masterClrMapping/>
+  </p:clrMapOvr>
+</p:sld>
+</file>
+
+<file path=ppt/slides/slide36.xml><?xml version="1.0" encoding="utf-8"?>
+<p:sld xmlns:a="http://schemas.openxmlformats.org/drawingml/2006/main" xmlns:r="http://schemas.openxmlformats.org/officeDocument/2006/relationships" xmlns:p="http://schemas.openxmlformats.org/presentationml/2006/main">
+  <p:cSld>
+    <p:spTree>
+      <p:nvGrpSpPr>
+        <p:cNvPr id="1" name=""/>
+        <p:cNvGrpSpPr/>
+        <p:nvPr/>
+      </p:nvGrpSpPr>
+      <p:grpSpPr>
+        <a:xfrm>
+          <a:off x="0" y="0"/>
+          <a:ext cx="0" cy="0"/>
+          <a:chOff x="0" y="0"/>
+          <a:chExt cx="0" cy="0"/>
+        </a:xfrm>
+      </p:grpSpPr>
+      <p:pic>
+        <p:nvPicPr>
+          <p:cNvPr id="5" name="Imagen 4">
+            <a:extLst>
+              <a:ext uri="{FF2B5EF4-FFF2-40B4-BE49-F238E27FC236}">
+                <a16:creationId xmlns:a16="http://schemas.microsoft.com/office/drawing/2014/main" id="{EFDD6B20-90D4-4CEE-81FD-75434C10BC0C}"/>
+              </a:ext>
+            </a:extLst>
+          </p:cNvPr>
+          <p:cNvPicPr>
+            <a:picLocks noChangeAspect="1"/>
+          </p:cNvPicPr>
+          <p:nvPr/>
+        </p:nvPicPr>
+        <p:blipFill>
+          <a:blip r:embed="rId2"/>
+          <a:stretch>
+            <a:fillRect/>
+          </a:stretch>
+        </p:blipFill>
+        <p:spPr>
+          <a:xfrm>
+            <a:off x="690650" y="2651327"/>
+            <a:ext cx="8915400" cy="1704975"/>
+          </a:xfrm>
+          <a:prstGeom prst="rect">
+            <a:avLst/>
+          </a:prstGeom>
+        </p:spPr>
+      </p:pic>
+      <p:pic>
+        <p:nvPicPr>
+          <p:cNvPr id="7" name="Imagen 6">
+            <a:extLst>
+              <a:ext uri="{FF2B5EF4-FFF2-40B4-BE49-F238E27FC236}">
+                <a16:creationId xmlns:a16="http://schemas.microsoft.com/office/drawing/2014/main" id="{C9BA500F-4873-4B80-9C49-F60F38B1F7BB}"/>
+              </a:ext>
+            </a:extLst>
+          </p:cNvPr>
+          <p:cNvPicPr>
+            <a:picLocks noChangeAspect="1"/>
+          </p:cNvPicPr>
+          <p:nvPr/>
+        </p:nvPicPr>
+        <p:blipFill>
+          <a:blip r:embed="rId3"/>
+          <a:stretch>
+            <a:fillRect/>
+          </a:stretch>
+        </p:blipFill>
+        <p:spPr>
+          <a:xfrm>
+            <a:off x="542925" y="2087447"/>
+            <a:ext cx="10925175" cy="609600"/>
+          </a:xfrm>
+          <a:prstGeom prst="rect">
+            <a:avLst/>
+          </a:prstGeom>
+        </p:spPr>
+      </p:pic>
+    </p:spTree>
+    <p:extLst>
+      <p:ext uri="{BB962C8B-B14F-4D97-AF65-F5344CB8AC3E}">
+        <p14:creationId xmlns:p14="http://schemas.microsoft.com/office/powerpoint/2010/main" val="3480109446"/>
+      </p:ext>
+    </p:extLst>
+  </p:cSld>
+  <p:clrMapOvr>
+    <a:masterClrMapping/>
+  </p:clrMapOvr>
+</p:sld>
+</file>
+
+<file path=ppt/slides/slide37.xml><?xml version="1.0" encoding="utf-8"?>
+<p:sld xmlns:a="http://schemas.openxmlformats.org/drawingml/2006/main" xmlns:r="http://schemas.openxmlformats.org/officeDocument/2006/relationships" xmlns:p="http://schemas.openxmlformats.org/presentationml/2006/main">
+  <p:cSld>
+    <p:spTree>
+      <p:nvGrpSpPr>
+        <p:cNvPr id="1" name=""/>
+        <p:cNvGrpSpPr/>
+        <p:nvPr/>
+      </p:nvGrpSpPr>
+      <p:grpSpPr>
+        <a:xfrm>
+          <a:off x="0" y="0"/>
+          <a:ext cx="0" cy="0"/>
+          <a:chOff x="0" y="0"/>
+          <a:chExt cx="0" cy="0"/>
+        </a:xfrm>
+      </p:grpSpPr>
+      <p:pic>
+        <p:nvPicPr>
+          <p:cNvPr id="7" name="Imagen 6">
+            <a:extLst>
+              <a:ext uri="{FF2B5EF4-FFF2-40B4-BE49-F238E27FC236}">
+                <a16:creationId xmlns:a16="http://schemas.microsoft.com/office/drawing/2014/main" id="{295DADE2-EE2C-4186-B29D-AE27664D2CC4}"/>
+              </a:ext>
+            </a:extLst>
+          </p:cNvPr>
+          <p:cNvPicPr>
+            <a:picLocks noChangeAspect="1"/>
+          </p:cNvPicPr>
+          <p:nvPr/>
+        </p:nvPicPr>
+        <p:blipFill>
+          <a:blip r:embed="rId2"/>
+          <a:stretch>
+            <a:fillRect/>
+          </a:stretch>
+        </p:blipFill>
+        <p:spPr>
+          <a:xfrm>
+            <a:off x="661987" y="485775"/>
+            <a:ext cx="10868025" cy="2943225"/>
+          </a:xfrm>
+          <a:prstGeom prst="rect">
+            <a:avLst/>
+          </a:prstGeom>
+        </p:spPr>
+      </p:pic>
+      <p:pic>
+        <p:nvPicPr>
+          <p:cNvPr id="9" name="Imagen 8">
+            <a:extLst>
+              <a:ext uri="{FF2B5EF4-FFF2-40B4-BE49-F238E27FC236}">
+                <a16:creationId xmlns:a16="http://schemas.microsoft.com/office/drawing/2014/main" id="{92092169-6F38-4CF2-AB66-77B6BCCBA339}"/>
+              </a:ext>
+            </a:extLst>
+          </p:cNvPr>
+          <p:cNvPicPr>
+            <a:picLocks noChangeAspect="1"/>
+          </p:cNvPicPr>
+          <p:nvPr/>
+        </p:nvPicPr>
+        <p:blipFill>
+          <a:blip r:embed="rId3"/>
+          <a:stretch>
+            <a:fillRect/>
+          </a:stretch>
+        </p:blipFill>
+        <p:spPr>
+          <a:xfrm>
+            <a:off x="4005261" y="3832773"/>
+            <a:ext cx="4181475" cy="2733675"/>
+          </a:xfrm>
+          <a:prstGeom prst="rect">
+            <a:avLst/>
+          </a:prstGeom>
+        </p:spPr>
+      </p:pic>
+    </p:spTree>
+    <p:extLst>
+      <p:ext uri="{BB962C8B-B14F-4D97-AF65-F5344CB8AC3E}">
+        <p14:creationId xmlns:p14="http://schemas.microsoft.com/office/powerpoint/2010/main" val="2728516200"/>
+      </p:ext>
+    </p:extLst>
+  </p:cSld>
+  <p:clrMapOvr>
+    <a:masterClrMapping/>
+  </p:clrMapOvr>
+</p:sld>
+</file>
+
+<file path=ppt/slides/slide38.xml><?xml version="1.0" encoding="utf-8"?>
+<p:sld xmlns:a="http://schemas.openxmlformats.org/drawingml/2006/main" xmlns:r="http://schemas.openxmlformats.org/officeDocument/2006/relationships" xmlns:p="http://schemas.openxmlformats.org/presentationml/2006/main">
+  <p:cSld>
+    <p:spTree>
+      <p:nvGrpSpPr>
+        <p:cNvPr id="1" name=""/>
+        <p:cNvGrpSpPr/>
+        <p:nvPr/>
+      </p:nvGrpSpPr>
+      <p:grpSpPr>
+        <a:xfrm>
+          <a:off x="0" y="0"/>
+          <a:ext cx="0" cy="0"/>
+          <a:chOff x="0" y="0"/>
+          <a:chExt cx="0" cy="0"/>
+        </a:xfrm>
+      </p:grpSpPr>
+      <p:sp>
+        <p:nvSpPr>
+          <p:cNvPr id="6" name="CuadroTexto 5">
+            <a:extLst>
+              <a:ext uri="{FF2B5EF4-FFF2-40B4-BE49-F238E27FC236}">
+                <a16:creationId xmlns:a16="http://schemas.microsoft.com/office/drawing/2014/main" id="{8D20EF07-1AB3-409F-8491-7F64BDE10B31}"/>
+              </a:ext>
+            </a:extLst>
+          </p:cNvPr>
+          <p:cNvSpPr txBox="1"/>
+          <p:nvPr/>
+        </p:nvSpPr>
+        <p:spPr>
+          <a:xfrm>
+            <a:off x="771005" y="786584"/>
+            <a:ext cx="10966565" cy="369332"/>
+          </a:xfrm>
+          <a:prstGeom prst="rect">
+            <a:avLst/>
+          </a:prstGeom>
+          <a:noFill/>
+        </p:spPr>
+        <p:txBody>
+          <a:bodyPr wrap="square">
+            <a:spAutoFit/>
+          </a:bodyPr>
+          <a:lstStyle/>
+          <a:p>
+            <a:r>
+              <a:rPr lang="es-MX" dirty="0"/>
+              <a:t>Si r(t) es suave, puede definir el vector normal unitario principal N(t),o simplemente normal unitario, como:</a:t>
+            </a:r>
+            <a:endParaRPr lang="es-CO" dirty="0"/>
+          </a:p>
+        </p:txBody>
+      </p:sp>
+      <p:pic>
+        <p:nvPicPr>
+          <p:cNvPr id="8" name="Imagen 7">
+            <a:extLst>
+              <a:ext uri="{FF2B5EF4-FFF2-40B4-BE49-F238E27FC236}">
+                <a16:creationId xmlns:a16="http://schemas.microsoft.com/office/drawing/2014/main" id="{6F6642DA-BCE9-4692-A340-29D5B3C976DD}"/>
+              </a:ext>
+            </a:extLst>
+          </p:cNvPr>
+          <p:cNvPicPr>
+            <a:picLocks noChangeAspect="1"/>
+          </p:cNvPicPr>
+          <p:nvPr/>
+        </p:nvPicPr>
+        <p:blipFill>
+          <a:blip r:embed="rId2"/>
+          <a:stretch>
+            <a:fillRect/>
+          </a:stretch>
+        </p:blipFill>
+        <p:spPr>
+          <a:xfrm>
+            <a:off x="771005" y="1155916"/>
+            <a:ext cx="9062951" cy="1798268"/>
+          </a:xfrm>
+          <a:prstGeom prst="rect">
+            <a:avLst/>
+          </a:prstGeom>
+        </p:spPr>
+      </p:pic>
+      <p:pic>
+        <p:nvPicPr>
+          <p:cNvPr id="10" name="Imagen 9">
+            <a:extLst>
+              <a:ext uri="{FF2B5EF4-FFF2-40B4-BE49-F238E27FC236}">
+                <a16:creationId xmlns:a16="http://schemas.microsoft.com/office/drawing/2014/main" id="{55705C0C-1F93-47D3-A890-8495E9A4B81F}"/>
+              </a:ext>
+            </a:extLst>
+          </p:cNvPr>
+          <p:cNvPicPr>
+            <a:picLocks noChangeAspect="1"/>
+          </p:cNvPicPr>
+          <p:nvPr/>
+        </p:nvPicPr>
+        <p:blipFill>
+          <a:blip r:embed="rId3"/>
+          <a:stretch>
+            <a:fillRect/>
+          </a:stretch>
+        </p:blipFill>
+        <p:spPr>
+          <a:xfrm>
+            <a:off x="3919537" y="3328216"/>
+            <a:ext cx="4352925" cy="2743200"/>
+          </a:xfrm>
+          <a:prstGeom prst="rect">
+            <a:avLst/>
+          </a:prstGeom>
+        </p:spPr>
+      </p:pic>
+    </p:spTree>
+    <p:extLst>
+      <p:ext uri="{BB962C8B-B14F-4D97-AF65-F5344CB8AC3E}">
+        <p14:creationId xmlns:p14="http://schemas.microsoft.com/office/powerpoint/2010/main" val="3968232004"/>
+      </p:ext>
+    </p:extLst>
+  </p:cSld>
+  <p:clrMapOvr>
+    <a:masterClrMapping/>
+  </p:clrMapOvr>
+</p:sld>
+</file>
+
+<file path=ppt/slides/slide39.xml><?xml version="1.0" encoding="utf-8"?>
+<p:sld xmlns:a="http://schemas.openxmlformats.org/drawingml/2006/main" xmlns:r="http://schemas.openxmlformats.org/officeDocument/2006/relationships" xmlns:p="http://schemas.openxmlformats.org/presentationml/2006/main">
+  <p:cSld>
+    <p:spTree>
+      <p:nvGrpSpPr>
+        <p:cNvPr id="1" name=""/>
+        <p:cNvGrpSpPr/>
+        <p:nvPr/>
+      </p:nvGrpSpPr>
+      <p:grpSpPr>
+        <a:xfrm>
+          <a:off x="0" y="0"/>
+          <a:ext cx="0" cy="0"/>
+          <a:chOff x="0" y="0"/>
+          <a:chExt cx="0" cy="0"/>
+        </a:xfrm>
+      </p:grpSpPr>
+      <p:sp>
+        <p:nvSpPr>
+          <p:cNvPr id="2" name="Título 1">
+            <a:extLst>
+              <a:ext uri="{FF2B5EF4-FFF2-40B4-BE49-F238E27FC236}">
+                <a16:creationId xmlns:a16="http://schemas.microsoft.com/office/drawing/2014/main" id="{1BD355D1-084F-406D-8185-66C5044F8874}"/>
+              </a:ext>
+            </a:extLst>
+          </p:cNvPr>
+          <p:cNvSpPr>
+            <a:spLocks noGrp="1"/>
+          </p:cNvSpPr>
+          <p:nvPr>
+            <p:ph type="title"/>
+          </p:nvPr>
+        </p:nvSpPr>
+        <p:spPr/>
+        <p:txBody>
+          <a:bodyPr/>
+          <a:lstStyle/>
+          <a:p>
+            <a:r>
+              <a:rPr lang="es-MX" dirty="0"/>
+              <a:t>Derivadas parciales</a:t>
+            </a:r>
+            <a:endParaRPr lang="es-CO" dirty="0"/>
+          </a:p>
+        </p:txBody>
+      </p:sp>
+    </p:spTree>
+    <p:extLst>
+      <p:ext uri="{BB962C8B-B14F-4D97-AF65-F5344CB8AC3E}">
+        <p14:creationId xmlns:p14="http://schemas.microsoft.com/office/powerpoint/2010/main" val="1112179519"/>
       </p:ext>
     </p:extLst>
   </p:cSld>
@@ -6267,6 +9295,86 @@
     <p:extLst>
       <p:ext uri="{BB962C8B-B14F-4D97-AF65-F5344CB8AC3E}">
         <p14:creationId xmlns:p14="http://schemas.microsoft.com/office/powerpoint/2010/main" val="2923215291"/>
+      </p:ext>
+    </p:extLst>
+  </p:cSld>
+  <p:clrMapOvr>
+    <a:masterClrMapping/>
+  </p:clrMapOvr>
+</p:sld>
+</file>
+
+<file path=ppt/slides/slide40.xml><?xml version="1.0" encoding="utf-8"?>
+<p:sld xmlns:a="http://schemas.openxmlformats.org/drawingml/2006/main" xmlns:r="http://schemas.openxmlformats.org/officeDocument/2006/relationships" xmlns:p="http://schemas.openxmlformats.org/presentationml/2006/main">
+  <p:cSld>
+    <p:spTree>
+      <p:nvGrpSpPr>
+        <p:cNvPr id="1" name=""/>
+        <p:cNvGrpSpPr/>
+        <p:nvPr/>
+      </p:nvGrpSpPr>
+      <p:grpSpPr>
+        <a:xfrm>
+          <a:off x="0" y="0"/>
+          <a:ext cx="0" cy="0"/>
+          <a:chOff x="0" y="0"/>
+          <a:chExt cx="0" cy="0"/>
+        </a:xfrm>
+      </p:grpSpPr>
+      <p:sp>
+        <p:nvSpPr>
+          <p:cNvPr id="2" name="Título 1">
+            <a:extLst>
+              <a:ext uri="{FF2B5EF4-FFF2-40B4-BE49-F238E27FC236}">
+                <a16:creationId xmlns:a16="http://schemas.microsoft.com/office/drawing/2014/main" id="{F703B6EE-DC37-47FD-82A1-CD3F907C3A0F}"/>
+              </a:ext>
+            </a:extLst>
+          </p:cNvPr>
+          <p:cNvSpPr>
+            <a:spLocks noGrp="1"/>
+          </p:cNvSpPr>
+          <p:nvPr>
+            <p:ph type="title"/>
+          </p:nvPr>
+        </p:nvSpPr>
+        <p:spPr/>
+        <p:txBody>
+          <a:bodyPr/>
+          <a:lstStyle/>
+          <a:p>
+            <a:endParaRPr lang="es-CO" dirty="0"/>
+          </a:p>
+        </p:txBody>
+      </p:sp>
+      <p:sp>
+        <p:nvSpPr>
+          <p:cNvPr id="3" name="Marcador de contenido 2">
+            <a:extLst>
+              <a:ext uri="{FF2B5EF4-FFF2-40B4-BE49-F238E27FC236}">
+                <a16:creationId xmlns:a16="http://schemas.microsoft.com/office/drawing/2014/main" id="{05B51976-13F6-4B18-85E7-D261353847F7}"/>
+              </a:ext>
+            </a:extLst>
+          </p:cNvPr>
+          <p:cNvSpPr>
+            <a:spLocks noGrp="1"/>
+          </p:cNvSpPr>
+          <p:nvPr>
+            <p:ph idx="1"/>
+          </p:nvPr>
+        </p:nvSpPr>
+        <p:spPr/>
+        <p:txBody>
+          <a:bodyPr/>
+          <a:lstStyle/>
+          <a:p>
+            <a:endParaRPr lang="es-CO"/>
+          </a:p>
+        </p:txBody>
+      </p:sp>
+    </p:spTree>
+    <p:extLst>
+      <p:ext uri="{BB962C8B-B14F-4D97-AF65-F5344CB8AC3E}">
+        <p14:creationId xmlns:p14="http://schemas.microsoft.com/office/powerpoint/2010/main" val="1775382118"/>
       </p:ext>
     </p:extLst>
   </p:cSld>

</xml_diff>